<commit_message>
Revisi pasca sidang done
</commit_message>
<xml_diff>
--- a/images/Presentation1.pptx
+++ b/images/Presentation1.pptx
@@ -6,6 +6,7 @@
   </p:sldMasterIdLst>
   <p:sldIdLst>
     <p:sldId id="257" r:id="rId2"/>
+    <p:sldId id="258" r:id="rId3"/>
   </p:sldIdLst>
   <p:sldSz cx="32004000" cy="8229600"/>
   <p:notesSz cx="6858000" cy="9144000"/>
@@ -243,7 +244,7 @@
           <a:p>
             <a:fld id="{2CCB48A9-EC99-4622-BD95-6542BDF0117B}" type="datetimeFigureOut">
               <a:rPr lang="en-US" smtClean="0"/>
-              <a:t>12/27/2016</a:t>
+              <a:t>1/11/2017</a:t>
             </a:fld>
             <a:endParaRPr lang="en-US"/>
           </a:p>
@@ -413,7 +414,7 @@
           <a:p>
             <a:fld id="{2CCB48A9-EC99-4622-BD95-6542BDF0117B}" type="datetimeFigureOut">
               <a:rPr lang="en-US" smtClean="0"/>
-              <a:t>12/27/2016</a:t>
+              <a:t>1/11/2017</a:t>
             </a:fld>
             <a:endParaRPr lang="en-US"/>
           </a:p>
@@ -593,7 +594,7 @@
           <a:p>
             <a:fld id="{2CCB48A9-EC99-4622-BD95-6542BDF0117B}" type="datetimeFigureOut">
               <a:rPr lang="en-US" smtClean="0"/>
-              <a:t>12/27/2016</a:t>
+              <a:t>1/11/2017</a:t>
             </a:fld>
             <a:endParaRPr lang="en-US"/>
           </a:p>
@@ -763,7 +764,7 @@
           <a:p>
             <a:fld id="{2CCB48A9-EC99-4622-BD95-6542BDF0117B}" type="datetimeFigureOut">
               <a:rPr lang="en-US" smtClean="0"/>
-              <a:t>12/27/2016</a:t>
+              <a:t>1/11/2017</a:t>
             </a:fld>
             <a:endParaRPr lang="en-US"/>
           </a:p>
@@ -1009,7 +1010,7 @@
           <a:p>
             <a:fld id="{2CCB48A9-EC99-4622-BD95-6542BDF0117B}" type="datetimeFigureOut">
               <a:rPr lang="en-US" smtClean="0"/>
-              <a:t>12/27/2016</a:t>
+              <a:t>1/11/2017</a:t>
             </a:fld>
             <a:endParaRPr lang="en-US"/>
           </a:p>
@@ -1241,7 +1242,7 @@
           <a:p>
             <a:fld id="{2CCB48A9-EC99-4622-BD95-6542BDF0117B}" type="datetimeFigureOut">
               <a:rPr lang="en-US" smtClean="0"/>
-              <a:t>12/27/2016</a:t>
+              <a:t>1/11/2017</a:t>
             </a:fld>
             <a:endParaRPr lang="en-US"/>
           </a:p>
@@ -1608,7 +1609,7 @@
           <a:p>
             <a:fld id="{2CCB48A9-EC99-4622-BD95-6542BDF0117B}" type="datetimeFigureOut">
               <a:rPr lang="en-US" smtClean="0"/>
-              <a:t>12/27/2016</a:t>
+              <a:t>1/11/2017</a:t>
             </a:fld>
             <a:endParaRPr lang="en-US"/>
           </a:p>
@@ -1726,7 +1727,7 @@
           <a:p>
             <a:fld id="{2CCB48A9-EC99-4622-BD95-6542BDF0117B}" type="datetimeFigureOut">
               <a:rPr lang="en-US" smtClean="0"/>
-              <a:t>12/27/2016</a:t>
+              <a:t>1/11/2017</a:t>
             </a:fld>
             <a:endParaRPr lang="en-US"/>
           </a:p>
@@ -1821,7 +1822,7 @@
           <a:p>
             <a:fld id="{2CCB48A9-EC99-4622-BD95-6542BDF0117B}" type="datetimeFigureOut">
               <a:rPr lang="en-US" smtClean="0"/>
-              <a:t>12/27/2016</a:t>
+              <a:t>1/11/2017</a:t>
             </a:fld>
             <a:endParaRPr lang="en-US"/>
           </a:p>
@@ -2098,7 +2099,7 @@
           <a:p>
             <a:fld id="{2CCB48A9-EC99-4622-BD95-6542BDF0117B}" type="datetimeFigureOut">
               <a:rPr lang="en-US" smtClean="0"/>
-              <a:t>12/27/2016</a:t>
+              <a:t>1/11/2017</a:t>
             </a:fld>
             <a:endParaRPr lang="en-US"/>
           </a:p>
@@ -2355,7 +2356,7 @@
           <a:p>
             <a:fld id="{2CCB48A9-EC99-4622-BD95-6542BDF0117B}" type="datetimeFigureOut">
               <a:rPr lang="en-US" smtClean="0"/>
-              <a:t>12/27/2016</a:t>
+              <a:t>1/11/2017</a:t>
             </a:fld>
             <a:endParaRPr lang="en-US"/>
           </a:p>
@@ -2568,7 +2569,7 @@
           <a:p>
             <a:fld id="{2CCB48A9-EC99-4622-BD95-6542BDF0117B}" type="datetimeFigureOut">
               <a:rPr lang="en-US" smtClean="0"/>
-              <a:t>12/27/2016</a:t>
+              <a:t>1/11/2017</a:t>
             </a:fld>
             <a:endParaRPr lang="en-US"/>
           </a:p>
@@ -5534,6 +5535,7 @@
                 <p:nvCxnSpPr>
                   <p:cNvPr id="104" name="Straight Arrow Connector 103"/>
                   <p:cNvCxnSpPr>
+                    <a:cxnSpLocks/>
                     <a:endCxn id="99" idx="2"/>
                   </p:cNvCxnSpPr>
                   <p:nvPr/>
@@ -5569,6 +5571,7 @@
                 <p:nvCxnSpPr>
                   <p:cNvPr id="106" name="Straight Arrow Connector 105"/>
                   <p:cNvCxnSpPr>
+                    <a:cxnSpLocks/>
                     <a:endCxn id="100" idx="2"/>
                   </p:cNvCxnSpPr>
                   <p:nvPr/>
@@ -5604,6 +5607,7 @@
                 <p:nvCxnSpPr>
                   <p:cNvPr id="108" name="Straight Arrow Connector 107"/>
                   <p:cNvCxnSpPr>
+                    <a:cxnSpLocks/>
                     <a:endCxn id="101" idx="2"/>
                   </p:cNvCxnSpPr>
                   <p:nvPr/>
@@ -5639,6 +5643,7 @@
                 <p:nvCxnSpPr>
                   <p:cNvPr id="110" name="Straight Arrow Connector 109"/>
                   <p:cNvCxnSpPr>
+                    <a:cxnSpLocks/>
                     <a:endCxn id="102" idx="2"/>
                   </p:cNvCxnSpPr>
                   <p:nvPr/>
@@ -7544,6 +7549,7 @@
           <p:nvCxnSpPr>
             <p:cNvPr id="198" name="Connector: Elbow 197"/>
             <p:cNvCxnSpPr>
+              <a:cxnSpLocks/>
               <a:stCxn id="99" idx="0"/>
               <a:endCxn id="78" idx="2"/>
             </p:cNvCxnSpPr>
@@ -7582,6 +7588,7 @@
           <p:nvCxnSpPr>
             <p:cNvPr id="201" name="Connector: Elbow 200"/>
             <p:cNvCxnSpPr>
+              <a:cxnSpLocks/>
               <a:stCxn id="100" idx="0"/>
               <a:endCxn id="79" idx="2"/>
             </p:cNvCxnSpPr>
@@ -7620,6 +7627,7 @@
           <p:nvCxnSpPr>
             <p:cNvPr id="204" name="Connector: Elbow 203"/>
             <p:cNvCxnSpPr>
+              <a:cxnSpLocks/>
               <a:stCxn id="101" idx="0"/>
               <a:endCxn id="80" idx="2"/>
             </p:cNvCxnSpPr>
@@ -7658,6 +7666,7 @@
           <p:nvCxnSpPr>
             <p:cNvPr id="207" name="Connector: Elbow 206"/>
             <p:cNvCxnSpPr>
+              <a:cxnSpLocks/>
               <a:stCxn id="102" idx="0"/>
               <a:endCxn id="81" idx="2"/>
             </p:cNvCxnSpPr>
@@ -7861,6 +7870,3801 @@
     <p:extLst>
       <p:ext uri="{BB962C8B-B14F-4D97-AF65-F5344CB8AC3E}">
         <p14:creationId xmlns:p14="http://schemas.microsoft.com/office/powerpoint/2010/main" val="1004040134"/>
+      </p:ext>
+    </p:extLst>
+  </p:cSld>
+  <p:clrMapOvr>
+    <a:masterClrMapping/>
+  </p:clrMapOvr>
+</p:sld>
+</file>
+
+<file path=ppt/slides/slide2.xml><?xml version="1.0" encoding="utf-8"?>
+<p:sld xmlns:a="http://schemas.openxmlformats.org/drawingml/2006/main" xmlns:r="http://schemas.openxmlformats.org/officeDocument/2006/relationships" xmlns:p="http://schemas.openxmlformats.org/presentationml/2006/main">
+  <p:cSld>
+    <p:spTree>
+      <p:nvGrpSpPr>
+        <p:cNvPr id="1" name=""/>
+        <p:cNvGrpSpPr/>
+        <p:nvPr/>
+      </p:nvGrpSpPr>
+      <p:grpSpPr>
+        <a:xfrm>
+          <a:off x="0" y="0"/>
+          <a:ext cx="0" cy="0"/>
+          <a:chOff x="0" y="0"/>
+          <a:chExt cx="0" cy="0"/>
+        </a:xfrm>
+      </p:grpSpPr>
+      <p:grpSp>
+        <p:nvGrpSpPr>
+          <p:cNvPr id="61" name="Group 60"/>
+          <p:cNvGrpSpPr/>
+          <p:nvPr/>
+        </p:nvGrpSpPr>
+        <p:grpSpPr>
+          <a:xfrm>
+            <a:off x="5196894" y="1137067"/>
+            <a:ext cx="17650955" cy="8306455"/>
+            <a:chOff x="7269534" y="-224373"/>
+            <a:chExt cx="17650955" cy="8306455"/>
+          </a:xfrm>
+        </p:grpSpPr>
+        <p:grpSp>
+          <p:nvGrpSpPr>
+            <p:cNvPr id="83" name="Group 82"/>
+            <p:cNvGrpSpPr/>
+            <p:nvPr/>
+          </p:nvGrpSpPr>
+          <p:grpSpPr>
+            <a:xfrm>
+              <a:off x="12500264" y="2495234"/>
+              <a:ext cx="7097405" cy="858570"/>
+              <a:chOff x="13150891" y="5893558"/>
+              <a:chExt cx="7097405" cy="858570"/>
+            </a:xfrm>
+          </p:grpSpPr>
+          <p:sp>
+            <p:nvSpPr>
+              <p:cNvPr id="78" name="Rectangle 77"/>
+              <p:cNvSpPr/>
+              <p:nvPr/>
+            </p:nvSpPr>
+            <p:spPr>
+              <a:xfrm>
+                <a:off x="13150891" y="5924814"/>
+                <a:ext cx="985983" cy="827314"/>
+              </a:xfrm>
+              <a:prstGeom prst="rect">
+                <a:avLst/>
+              </a:prstGeom>
+              <a:pattFill prst="wave">
+                <a:fgClr>
+                  <a:schemeClr val="accent3"/>
+                </a:fgClr>
+                <a:bgClr>
+                  <a:schemeClr val="bg1"/>
+                </a:bgClr>
+              </a:pattFill>
+            </p:spPr>
+            <p:style>
+              <a:lnRef idx="2">
+                <a:schemeClr val="accent3">
+                  <a:shade val="50000"/>
+                </a:schemeClr>
+              </a:lnRef>
+              <a:fillRef idx="1">
+                <a:schemeClr val="accent3"/>
+              </a:fillRef>
+              <a:effectRef idx="0">
+                <a:schemeClr val="accent3"/>
+              </a:effectRef>
+              <a:fontRef idx="minor">
+                <a:schemeClr val="lt1"/>
+              </a:fontRef>
+            </p:style>
+            <p:txBody>
+              <a:bodyPr rot="0" spcFirstLastPara="0" vertOverflow="overflow" horzOverflow="overflow" vert="horz" wrap="square" lIns="91440" tIns="45720" rIns="91440" bIns="45720" numCol="1" spcCol="0" rtlCol="0" fromWordArt="0" anchor="ctr" anchorCtr="0" forceAA="0" compatLnSpc="1">
+                <a:prstTxWarp prst="textNoShape">
+                  <a:avLst/>
+                </a:prstTxWarp>
+                <a:noAutofit/>
+              </a:bodyPr>
+              <a:lstStyle/>
+              <a:p>
+                <a:pPr algn="ctr"/>
+                <a:endParaRPr lang="en-US" dirty="0"/>
+              </a:p>
+            </p:txBody>
+          </p:sp>
+          <p:sp>
+            <p:nvSpPr>
+              <p:cNvPr id="79" name="Rectangle 78"/>
+              <p:cNvSpPr/>
+              <p:nvPr/>
+            </p:nvSpPr>
+            <p:spPr>
+              <a:xfrm>
+                <a:off x="15196499" y="5893558"/>
+                <a:ext cx="985983" cy="827314"/>
+              </a:xfrm>
+              <a:prstGeom prst="rect">
+                <a:avLst/>
+              </a:prstGeom>
+              <a:pattFill prst="wave">
+                <a:fgClr>
+                  <a:schemeClr val="accent3"/>
+                </a:fgClr>
+                <a:bgClr>
+                  <a:schemeClr val="bg1"/>
+                </a:bgClr>
+              </a:pattFill>
+            </p:spPr>
+            <p:style>
+              <a:lnRef idx="2">
+                <a:schemeClr val="accent3">
+                  <a:shade val="50000"/>
+                </a:schemeClr>
+              </a:lnRef>
+              <a:fillRef idx="1">
+                <a:schemeClr val="accent3"/>
+              </a:fillRef>
+              <a:effectRef idx="0">
+                <a:schemeClr val="accent3"/>
+              </a:effectRef>
+              <a:fontRef idx="minor">
+                <a:schemeClr val="lt1"/>
+              </a:fontRef>
+            </p:style>
+            <p:txBody>
+              <a:bodyPr rot="0" spcFirstLastPara="0" vertOverflow="overflow" horzOverflow="overflow" vert="horz" wrap="square" lIns="91440" tIns="45720" rIns="91440" bIns="45720" numCol="1" spcCol="0" rtlCol="0" fromWordArt="0" anchor="ctr" anchorCtr="0" forceAA="0" compatLnSpc="1">
+                <a:prstTxWarp prst="textNoShape">
+                  <a:avLst/>
+                </a:prstTxWarp>
+                <a:noAutofit/>
+              </a:bodyPr>
+              <a:lstStyle/>
+              <a:p>
+                <a:pPr algn="ctr"/>
+                <a:endParaRPr lang="en-US"/>
+              </a:p>
+            </p:txBody>
+          </p:sp>
+          <p:sp>
+            <p:nvSpPr>
+              <p:cNvPr id="80" name="Rectangle 79"/>
+              <p:cNvSpPr/>
+              <p:nvPr/>
+            </p:nvSpPr>
+            <p:spPr>
+              <a:xfrm>
+                <a:off x="17229406" y="5893558"/>
+                <a:ext cx="985983" cy="827314"/>
+              </a:xfrm>
+              <a:prstGeom prst="rect">
+                <a:avLst/>
+              </a:prstGeom>
+              <a:pattFill prst="wave">
+                <a:fgClr>
+                  <a:schemeClr val="accent3"/>
+                </a:fgClr>
+                <a:bgClr>
+                  <a:schemeClr val="bg1"/>
+                </a:bgClr>
+              </a:pattFill>
+            </p:spPr>
+            <p:style>
+              <a:lnRef idx="2">
+                <a:schemeClr val="accent3">
+                  <a:shade val="50000"/>
+                </a:schemeClr>
+              </a:lnRef>
+              <a:fillRef idx="1">
+                <a:schemeClr val="accent3"/>
+              </a:fillRef>
+              <a:effectRef idx="0">
+                <a:schemeClr val="accent3"/>
+              </a:effectRef>
+              <a:fontRef idx="minor">
+                <a:schemeClr val="lt1"/>
+              </a:fontRef>
+            </p:style>
+            <p:txBody>
+              <a:bodyPr rot="0" spcFirstLastPara="0" vertOverflow="overflow" horzOverflow="overflow" vert="horz" wrap="square" lIns="91440" tIns="45720" rIns="91440" bIns="45720" numCol="1" spcCol="0" rtlCol="0" fromWordArt="0" anchor="ctr" anchorCtr="0" forceAA="0" compatLnSpc="1">
+                <a:prstTxWarp prst="textNoShape">
+                  <a:avLst/>
+                </a:prstTxWarp>
+                <a:noAutofit/>
+              </a:bodyPr>
+              <a:lstStyle/>
+              <a:p>
+                <a:pPr algn="ctr"/>
+                <a:endParaRPr lang="en-US"/>
+              </a:p>
+            </p:txBody>
+          </p:sp>
+          <p:sp>
+            <p:nvSpPr>
+              <p:cNvPr id="81" name="Rectangle 80"/>
+              <p:cNvSpPr/>
+              <p:nvPr/>
+            </p:nvSpPr>
+            <p:spPr>
+              <a:xfrm>
+                <a:off x="19262313" y="5893558"/>
+                <a:ext cx="985983" cy="827314"/>
+              </a:xfrm>
+              <a:prstGeom prst="rect">
+                <a:avLst/>
+              </a:prstGeom>
+              <a:pattFill prst="wave">
+                <a:fgClr>
+                  <a:schemeClr val="accent3"/>
+                </a:fgClr>
+                <a:bgClr>
+                  <a:schemeClr val="bg1"/>
+                </a:bgClr>
+              </a:pattFill>
+            </p:spPr>
+            <p:style>
+              <a:lnRef idx="2">
+                <a:schemeClr val="accent3">
+                  <a:shade val="50000"/>
+                </a:schemeClr>
+              </a:lnRef>
+              <a:fillRef idx="1">
+                <a:schemeClr val="accent3"/>
+              </a:fillRef>
+              <a:effectRef idx="0">
+                <a:schemeClr val="accent3"/>
+              </a:effectRef>
+              <a:fontRef idx="minor">
+                <a:schemeClr val="lt1"/>
+              </a:fontRef>
+            </p:style>
+            <p:txBody>
+              <a:bodyPr rot="0" spcFirstLastPara="0" vertOverflow="overflow" horzOverflow="overflow" vert="horz" wrap="square" lIns="91440" tIns="45720" rIns="91440" bIns="45720" numCol="1" spcCol="0" rtlCol="0" fromWordArt="0" anchor="ctr" anchorCtr="0" forceAA="0" compatLnSpc="1">
+                <a:prstTxWarp prst="textNoShape">
+                  <a:avLst/>
+                </a:prstTxWarp>
+                <a:noAutofit/>
+              </a:bodyPr>
+              <a:lstStyle/>
+              <a:p>
+                <a:pPr algn="ctr"/>
+                <a:endParaRPr lang="en-US"/>
+              </a:p>
+            </p:txBody>
+          </p:sp>
+        </p:grpSp>
+        <p:grpSp>
+          <p:nvGrpSpPr>
+            <p:cNvPr id="82" name="Group 81"/>
+            <p:cNvGrpSpPr/>
+            <p:nvPr/>
+          </p:nvGrpSpPr>
+          <p:grpSpPr>
+            <a:xfrm>
+              <a:off x="12500264" y="-224373"/>
+              <a:ext cx="9247195" cy="6609567"/>
+              <a:chOff x="9578069" y="613650"/>
+              <a:chExt cx="9247195" cy="6609567"/>
+            </a:xfrm>
+          </p:grpSpPr>
+          <p:grpSp>
+            <p:nvGrpSpPr>
+              <p:cNvPr id="21" name="Group 20"/>
+              <p:cNvGrpSpPr/>
+              <p:nvPr/>
+            </p:nvGrpSpPr>
+            <p:grpSpPr>
+              <a:xfrm>
+                <a:off x="10071061" y="1056284"/>
+                <a:ext cx="6114306" cy="2308229"/>
+                <a:chOff x="2024743" y="2836486"/>
+                <a:chExt cx="6114306" cy="2308229"/>
+              </a:xfrm>
+            </p:grpSpPr>
+            <p:cxnSp>
+              <p:nvCxnSpPr>
+                <p:cNvPr id="26" name="Straight Arrow Connector 25"/>
+                <p:cNvCxnSpPr>
+                  <a:stCxn id="22" idx="0"/>
+                </p:cNvCxnSpPr>
+                <p:nvPr/>
+              </p:nvCxnSpPr>
+              <p:spPr>
+                <a:xfrm flipV="1">
+                  <a:off x="2024743" y="2867742"/>
+                  <a:ext cx="0" cy="763056"/>
+                </a:xfrm>
+                <a:prstGeom prst="straightConnector1">
+                  <a:avLst/>
+                </a:prstGeom>
+                <a:ln w="28575">
+                  <a:tailEnd type="triangle"/>
+                </a:ln>
+              </p:spPr>
+              <p:style>
+                <a:lnRef idx="1">
+                  <a:schemeClr val="dk1"/>
+                </a:lnRef>
+                <a:fillRef idx="0">
+                  <a:schemeClr val="dk1"/>
+                </a:fillRef>
+                <a:effectRef idx="0">
+                  <a:schemeClr val="dk1"/>
+                </a:effectRef>
+                <a:fontRef idx="minor">
+                  <a:schemeClr val="tx1"/>
+                </a:fontRef>
+              </p:style>
+            </p:cxnSp>
+            <p:cxnSp>
+              <p:nvCxnSpPr>
+                <p:cNvPr id="27" name="Straight Arrow Connector 26"/>
+                <p:cNvCxnSpPr>
+                  <a:stCxn id="78" idx="0"/>
+                  <a:endCxn id="22" idx="2"/>
+                </p:cNvCxnSpPr>
+                <p:nvPr/>
+              </p:nvCxnSpPr>
+              <p:spPr>
+                <a:xfrm flipV="1">
+                  <a:off x="2024743" y="4458112"/>
+                  <a:ext cx="0" cy="686603"/>
+                </a:xfrm>
+                <a:prstGeom prst="straightConnector1">
+                  <a:avLst/>
+                </a:prstGeom>
+                <a:ln w="28575">
+                  <a:tailEnd type="triangle"/>
+                </a:ln>
+              </p:spPr>
+              <p:style>
+                <a:lnRef idx="1">
+                  <a:schemeClr val="dk1"/>
+                </a:lnRef>
+                <a:fillRef idx="0">
+                  <a:schemeClr val="dk1"/>
+                </a:fillRef>
+                <a:effectRef idx="0">
+                  <a:schemeClr val="dk1"/>
+                </a:effectRef>
+                <a:fontRef idx="minor">
+                  <a:schemeClr val="tx1"/>
+                </a:fontRef>
+              </p:style>
+            </p:cxnSp>
+            <p:cxnSp>
+              <p:nvCxnSpPr>
+                <p:cNvPr id="28" name="Straight Arrow Connector 27"/>
+                <p:cNvCxnSpPr/>
+                <p:nvPr/>
+              </p:nvCxnSpPr>
+              <p:spPr>
+                <a:xfrm flipV="1">
+                  <a:off x="4060535" y="2836486"/>
+                  <a:ext cx="9816" cy="927945"/>
+                </a:xfrm>
+                <a:prstGeom prst="straightConnector1">
+                  <a:avLst/>
+                </a:prstGeom>
+                <a:ln w="28575">
+                  <a:tailEnd type="triangle"/>
+                </a:ln>
+              </p:spPr>
+              <p:style>
+                <a:lnRef idx="1">
+                  <a:schemeClr val="dk1"/>
+                </a:lnRef>
+                <a:fillRef idx="0">
+                  <a:schemeClr val="dk1"/>
+                </a:fillRef>
+                <a:effectRef idx="0">
+                  <a:schemeClr val="dk1"/>
+                </a:effectRef>
+                <a:fontRef idx="minor">
+                  <a:schemeClr val="tx1"/>
+                </a:fontRef>
+              </p:style>
+            </p:cxnSp>
+            <p:cxnSp>
+              <p:nvCxnSpPr>
+                <p:cNvPr id="29" name="Straight Arrow Connector 28"/>
+                <p:cNvCxnSpPr>
+                  <a:stCxn id="79" idx="0"/>
+                  <a:endCxn id="23" idx="2"/>
+                </p:cNvCxnSpPr>
+                <p:nvPr/>
+              </p:nvCxnSpPr>
+              <p:spPr>
+                <a:xfrm flipV="1">
+                  <a:off x="4070351" y="4426856"/>
+                  <a:ext cx="0" cy="686603"/>
+                </a:xfrm>
+                <a:prstGeom prst="straightConnector1">
+                  <a:avLst/>
+                </a:prstGeom>
+                <a:ln w="28575">
+                  <a:tailEnd type="triangle"/>
+                </a:ln>
+              </p:spPr>
+              <p:style>
+                <a:lnRef idx="1">
+                  <a:schemeClr val="dk1"/>
+                </a:lnRef>
+                <a:fillRef idx="0">
+                  <a:schemeClr val="dk1"/>
+                </a:fillRef>
+                <a:effectRef idx="0">
+                  <a:schemeClr val="dk1"/>
+                </a:effectRef>
+                <a:fontRef idx="minor">
+                  <a:schemeClr val="tx1"/>
+                </a:fontRef>
+              </p:style>
+            </p:cxnSp>
+            <p:cxnSp>
+              <p:nvCxnSpPr>
+                <p:cNvPr id="30" name="Straight Arrow Connector 29"/>
+                <p:cNvCxnSpPr/>
+                <p:nvPr/>
+              </p:nvCxnSpPr>
+              <p:spPr>
+                <a:xfrm flipV="1">
+                  <a:off x="6099792" y="2836486"/>
+                  <a:ext cx="3466" cy="943573"/>
+                </a:xfrm>
+                <a:prstGeom prst="straightConnector1">
+                  <a:avLst/>
+                </a:prstGeom>
+                <a:ln w="28575">
+                  <a:tailEnd type="triangle"/>
+                </a:ln>
+              </p:spPr>
+              <p:style>
+                <a:lnRef idx="1">
+                  <a:schemeClr val="dk1"/>
+                </a:lnRef>
+                <a:fillRef idx="0">
+                  <a:schemeClr val="dk1"/>
+                </a:fillRef>
+                <a:effectRef idx="0">
+                  <a:schemeClr val="dk1"/>
+                </a:effectRef>
+                <a:fontRef idx="minor">
+                  <a:schemeClr val="tx1"/>
+                </a:fontRef>
+              </p:style>
+            </p:cxnSp>
+            <p:cxnSp>
+              <p:nvCxnSpPr>
+                <p:cNvPr id="31" name="Straight Arrow Connector 30"/>
+                <p:cNvCxnSpPr>
+                  <a:stCxn id="80" idx="0"/>
+                  <a:endCxn id="24" idx="2"/>
+                </p:cNvCxnSpPr>
+                <p:nvPr/>
+              </p:nvCxnSpPr>
+              <p:spPr>
+                <a:xfrm flipV="1">
+                  <a:off x="6103258" y="4426856"/>
+                  <a:ext cx="0" cy="686603"/>
+                </a:xfrm>
+                <a:prstGeom prst="straightConnector1">
+                  <a:avLst/>
+                </a:prstGeom>
+                <a:ln w="28575">
+                  <a:tailEnd type="triangle"/>
+                </a:ln>
+              </p:spPr>
+              <p:style>
+                <a:lnRef idx="1">
+                  <a:schemeClr val="dk1"/>
+                </a:lnRef>
+                <a:fillRef idx="0">
+                  <a:schemeClr val="dk1"/>
+                </a:fillRef>
+                <a:effectRef idx="0">
+                  <a:schemeClr val="dk1"/>
+                </a:effectRef>
+                <a:fontRef idx="minor">
+                  <a:schemeClr val="tx1"/>
+                </a:fontRef>
+              </p:style>
+            </p:cxnSp>
+            <p:cxnSp>
+              <p:nvCxnSpPr>
+                <p:cNvPr id="32" name="Straight Arrow Connector 31"/>
+                <p:cNvCxnSpPr/>
+                <p:nvPr/>
+              </p:nvCxnSpPr>
+              <p:spPr>
+                <a:xfrm flipH="1" flipV="1">
+                  <a:off x="8136165" y="2836486"/>
+                  <a:ext cx="2884" cy="959201"/>
+                </a:xfrm>
+                <a:prstGeom prst="straightConnector1">
+                  <a:avLst/>
+                </a:prstGeom>
+                <a:ln w="28575">
+                  <a:tailEnd type="triangle"/>
+                </a:ln>
+              </p:spPr>
+              <p:style>
+                <a:lnRef idx="1">
+                  <a:schemeClr val="dk1"/>
+                </a:lnRef>
+                <a:fillRef idx="0">
+                  <a:schemeClr val="dk1"/>
+                </a:fillRef>
+                <a:effectRef idx="0">
+                  <a:schemeClr val="dk1"/>
+                </a:effectRef>
+                <a:fontRef idx="minor">
+                  <a:schemeClr val="tx1"/>
+                </a:fontRef>
+              </p:style>
+            </p:cxnSp>
+            <p:cxnSp>
+              <p:nvCxnSpPr>
+                <p:cNvPr id="33" name="Straight Arrow Connector 32"/>
+                <p:cNvCxnSpPr>
+                  <a:stCxn id="81" idx="0"/>
+                  <a:endCxn id="25" idx="2"/>
+                </p:cNvCxnSpPr>
+                <p:nvPr/>
+              </p:nvCxnSpPr>
+              <p:spPr>
+                <a:xfrm flipV="1">
+                  <a:off x="8136165" y="4426856"/>
+                  <a:ext cx="0" cy="686603"/>
+                </a:xfrm>
+                <a:prstGeom prst="straightConnector1">
+                  <a:avLst/>
+                </a:prstGeom>
+                <a:ln w="28575">
+                  <a:tailEnd type="triangle"/>
+                </a:ln>
+              </p:spPr>
+              <p:style>
+                <a:lnRef idx="1">
+                  <a:schemeClr val="dk1"/>
+                </a:lnRef>
+                <a:fillRef idx="0">
+                  <a:schemeClr val="dk1"/>
+                </a:fillRef>
+                <a:effectRef idx="0">
+                  <a:schemeClr val="dk1"/>
+                </a:effectRef>
+                <a:fontRef idx="minor">
+                  <a:schemeClr val="tx1"/>
+                </a:fontRef>
+              </p:style>
+            </p:cxnSp>
+            <p:cxnSp>
+              <p:nvCxnSpPr>
+                <p:cNvPr id="34" name="Straight Arrow Connector 33"/>
+                <p:cNvCxnSpPr/>
+                <p:nvPr/>
+              </p:nvCxnSpPr>
+              <p:spPr>
+                <a:xfrm>
+                  <a:off x="2517734" y="3844161"/>
+                  <a:ext cx="1059625" cy="0"/>
+                </a:xfrm>
+                <a:prstGeom prst="straightConnector1">
+                  <a:avLst/>
+                </a:prstGeom>
+                <a:ln w="28575">
+                  <a:tailEnd type="triangle"/>
+                </a:ln>
+              </p:spPr>
+              <p:style>
+                <a:lnRef idx="1">
+                  <a:schemeClr val="dk1"/>
+                </a:lnRef>
+                <a:fillRef idx="0">
+                  <a:schemeClr val="dk1"/>
+                </a:fillRef>
+                <a:effectRef idx="0">
+                  <a:schemeClr val="dk1"/>
+                </a:effectRef>
+                <a:fontRef idx="minor">
+                  <a:schemeClr val="tx1"/>
+                </a:fontRef>
+              </p:style>
+            </p:cxnSp>
+            <p:cxnSp>
+              <p:nvCxnSpPr>
+                <p:cNvPr id="35" name="Straight Arrow Connector 34"/>
+                <p:cNvCxnSpPr/>
+                <p:nvPr/>
+              </p:nvCxnSpPr>
+              <p:spPr>
+                <a:xfrm>
+                  <a:off x="4563342" y="3844161"/>
+                  <a:ext cx="1059625" cy="0"/>
+                </a:xfrm>
+                <a:prstGeom prst="straightConnector1">
+                  <a:avLst/>
+                </a:prstGeom>
+                <a:ln w="28575">
+                  <a:tailEnd type="triangle"/>
+                </a:ln>
+              </p:spPr>
+              <p:style>
+                <a:lnRef idx="1">
+                  <a:schemeClr val="dk1"/>
+                </a:lnRef>
+                <a:fillRef idx="0">
+                  <a:schemeClr val="dk1"/>
+                </a:fillRef>
+                <a:effectRef idx="0">
+                  <a:schemeClr val="dk1"/>
+                </a:effectRef>
+                <a:fontRef idx="minor">
+                  <a:schemeClr val="tx1"/>
+                </a:fontRef>
+              </p:style>
+            </p:cxnSp>
+            <p:sp>
+              <p:nvSpPr>
+                <p:cNvPr id="36" name="TextBox 35"/>
+                <p:cNvSpPr txBox="1"/>
+                <p:nvPr/>
+              </p:nvSpPr>
+              <p:spPr>
+                <a:xfrm>
+                  <a:off x="6583549" y="3813622"/>
+                  <a:ext cx="1078674" cy="461665"/>
+                </a:xfrm>
+                <a:prstGeom prst="rect">
+                  <a:avLst/>
+                </a:prstGeom>
+                <a:noFill/>
+              </p:spPr>
+              <p:txBody>
+                <a:bodyPr wrap="square" rtlCol="0">
+                  <a:spAutoFit/>
+                </a:bodyPr>
+                <a:lstStyle/>
+                <a:p>
+                  <a:pPr algn="ctr"/>
+                  <a:r>
+                    <a:rPr lang="en-US" sz="2400" dirty="0">
+                      <a:latin typeface="Courier New" panose="02070309020205020404" pitchFamily="49" charset="0"/>
+                      <a:cs typeface="Courier New" panose="02070309020205020404" pitchFamily="49" charset="0"/>
+                    </a:rPr>
+                    <a:t>…………</a:t>
+                  </a:r>
+                </a:p>
+              </p:txBody>
+            </p:sp>
+            <p:cxnSp>
+              <p:nvCxnSpPr>
+                <p:cNvPr id="37" name="Straight Arrow Connector 36"/>
+                <p:cNvCxnSpPr/>
+                <p:nvPr/>
+              </p:nvCxnSpPr>
+              <p:spPr>
+                <a:xfrm flipV="1">
+                  <a:off x="2517734" y="4195385"/>
+                  <a:ext cx="1059625" cy="18108"/>
+                </a:xfrm>
+                <a:prstGeom prst="straightConnector1">
+                  <a:avLst/>
+                </a:prstGeom>
+                <a:ln w="28575">
+                  <a:tailEnd type="triangle"/>
+                </a:ln>
+              </p:spPr>
+              <p:style>
+                <a:lnRef idx="1">
+                  <a:schemeClr val="dk1"/>
+                </a:lnRef>
+                <a:fillRef idx="0">
+                  <a:schemeClr val="dk1"/>
+                </a:fillRef>
+                <a:effectRef idx="0">
+                  <a:schemeClr val="dk1"/>
+                </a:effectRef>
+                <a:fontRef idx="minor">
+                  <a:schemeClr val="tx1"/>
+                </a:fontRef>
+              </p:style>
+            </p:cxnSp>
+            <p:cxnSp>
+              <p:nvCxnSpPr>
+                <p:cNvPr id="38" name="Straight Arrow Connector 37"/>
+                <p:cNvCxnSpPr/>
+                <p:nvPr/>
+              </p:nvCxnSpPr>
+              <p:spPr>
+                <a:xfrm>
+                  <a:off x="4563342" y="4244749"/>
+                  <a:ext cx="1059625" cy="0"/>
+                </a:xfrm>
+                <a:prstGeom prst="straightConnector1">
+                  <a:avLst/>
+                </a:prstGeom>
+                <a:ln w="28575">
+                  <a:tailEnd type="triangle"/>
+                </a:ln>
+              </p:spPr>
+              <p:style>
+                <a:lnRef idx="1">
+                  <a:schemeClr val="dk1"/>
+                </a:lnRef>
+                <a:fillRef idx="0">
+                  <a:schemeClr val="dk1"/>
+                </a:fillRef>
+                <a:effectRef idx="0">
+                  <a:schemeClr val="dk1"/>
+                </a:effectRef>
+                <a:fontRef idx="minor">
+                  <a:schemeClr val="tx1"/>
+                </a:fontRef>
+              </p:style>
+            </p:cxnSp>
+          </p:grpSp>
+          <p:sp>
+            <p:nvSpPr>
+              <p:cNvPr id="22" name="Rectangle 21"/>
+              <p:cNvSpPr/>
+              <p:nvPr/>
+            </p:nvSpPr>
+            <p:spPr>
+              <a:xfrm>
+                <a:off x="9578069" y="1850596"/>
+                <a:ext cx="985983" cy="827314"/>
+              </a:xfrm>
+              <a:prstGeom prst="rect">
+                <a:avLst/>
+              </a:prstGeom>
+              <a:pattFill prst="diagBrick">
+                <a:fgClr>
+                  <a:schemeClr val="accent3"/>
+                </a:fgClr>
+                <a:bgClr>
+                  <a:schemeClr val="bg1"/>
+                </a:bgClr>
+              </a:pattFill>
+            </p:spPr>
+            <p:style>
+              <a:lnRef idx="2">
+                <a:schemeClr val="accent3">
+                  <a:shade val="50000"/>
+                </a:schemeClr>
+              </a:lnRef>
+              <a:fillRef idx="1">
+                <a:schemeClr val="accent3"/>
+              </a:fillRef>
+              <a:effectRef idx="0">
+                <a:schemeClr val="accent3"/>
+              </a:effectRef>
+              <a:fontRef idx="minor">
+                <a:schemeClr val="lt1"/>
+              </a:fontRef>
+            </p:style>
+            <p:txBody>
+              <a:bodyPr rot="0" spcFirstLastPara="0" vertOverflow="overflow" horzOverflow="overflow" vert="horz" wrap="square" lIns="91440" tIns="45720" rIns="91440" bIns="45720" numCol="1" spcCol="0" rtlCol="0" fromWordArt="0" anchor="ctr" anchorCtr="0" forceAA="0" compatLnSpc="1">
+                <a:prstTxWarp prst="textNoShape">
+                  <a:avLst/>
+                </a:prstTxWarp>
+                <a:noAutofit/>
+              </a:bodyPr>
+              <a:lstStyle/>
+              <a:p>
+                <a:pPr algn="ctr"/>
+                <a:endParaRPr lang="en-US"/>
+              </a:p>
+            </p:txBody>
+          </p:sp>
+          <p:sp>
+            <p:nvSpPr>
+              <p:cNvPr id="23" name="Rectangle 22"/>
+              <p:cNvSpPr/>
+              <p:nvPr/>
+            </p:nvSpPr>
+            <p:spPr>
+              <a:xfrm>
+                <a:off x="11623677" y="1819340"/>
+                <a:ext cx="985983" cy="827314"/>
+              </a:xfrm>
+              <a:prstGeom prst="rect">
+                <a:avLst/>
+              </a:prstGeom>
+              <a:pattFill prst="diagBrick">
+                <a:fgClr>
+                  <a:schemeClr val="accent3"/>
+                </a:fgClr>
+                <a:bgClr>
+                  <a:schemeClr val="bg1"/>
+                </a:bgClr>
+              </a:pattFill>
+            </p:spPr>
+            <p:style>
+              <a:lnRef idx="2">
+                <a:schemeClr val="accent3">
+                  <a:shade val="50000"/>
+                </a:schemeClr>
+              </a:lnRef>
+              <a:fillRef idx="1">
+                <a:schemeClr val="accent3"/>
+              </a:fillRef>
+              <a:effectRef idx="0">
+                <a:schemeClr val="accent3"/>
+              </a:effectRef>
+              <a:fontRef idx="minor">
+                <a:schemeClr val="lt1"/>
+              </a:fontRef>
+            </p:style>
+            <p:txBody>
+              <a:bodyPr rot="0" spcFirstLastPara="0" vertOverflow="overflow" horzOverflow="overflow" vert="horz" wrap="square" lIns="91440" tIns="45720" rIns="91440" bIns="45720" numCol="1" spcCol="0" rtlCol="0" fromWordArt="0" anchor="ctr" anchorCtr="0" forceAA="0" compatLnSpc="1">
+                <a:prstTxWarp prst="textNoShape">
+                  <a:avLst/>
+                </a:prstTxWarp>
+                <a:noAutofit/>
+              </a:bodyPr>
+              <a:lstStyle/>
+              <a:p>
+                <a:pPr algn="ctr"/>
+                <a:endParaRPr lang="en-US"/>
+              </a:p>
+            </p:txBody>
+          </p:sp>
+          <p:sp>
+            <p:nvSpPr>
+              <p:cNvPr id="24" name="Rectangle 23"/>
+              <p:cNvSpPr/>
+              <p:nvPr/>
+            </p:nvSpPr>
+            <p:spPr>
+              <a:xfrm>
+                <a:off x="13656584" y="1819340"/>
+                <a:ext cx="985983" cy="827314"/>
+              </a:xfrm>
+              <a:prstGeom prst="rect">
+                <a:avLst/>
+              </a:prstGeom>
+              <a:pattFill prst="diagBrick">
+                <a:fgClr>
+                  <a:schemeClr val="accent3"/>
+                </a:fgClr>
+                <a:bgClr>
+                  <a:schemeClr val="bg1"/>
+                </a:bgClr>
+              </a:pattFill>
+            </p:spPr>
+            <p:style>
+              <a:lnRef idx="2">
+                <a:schemeClr val="accent3">
+                  <a:shade val="50000"/>
+                </a:schemeClr>
+              </a:lnRef>
+              <a:fillRef idx="1">
+                <a:schemeClr val="accent3"/>
+              </a:fillRef>
+              <a:effectRef idx="0">
+                <a:schemeClr val="accent3"/>
+              </a:effectRef>
+              <a:fontRef idx="minor">
+                <a:schemeClr val="lt1"/>
+              </a:fontRef>
+            </p:style>
+            <p:txBody>
+              <a:bodyPr rot="0" spcFirstLastPara="0" vertOverflow="overflow" horzOverflow="overflow" vert="horz" wrap="square" lIns="91440" tIns="45720" rIns="91440" bIns="45720" numCol="1" spcCol="0" rtlCol="0" fromWordArt="0" anchor="ctr" anchorCtr="0" forceAA="0" compatLnSpc="1">
+                <a:prstTxWarp prst="textNoShape">
+                  <a:avLst/>
+                </a:prstTxWarp>
+                <a:noAutofit/>
+              </a:bodyPr>
+              <a:lstStyle/>
+              <a:p>
+                <a:pPr algn="ctr"/>
+                <a:endParaRPr lang="en-US"/>
+              </a:p>
+            </p:txBody>
+          </p:sp>
+          <p:sp>
+            <p:nvSpPr>
+              <p:cNvPr id="25" name="Rectangle 24"/>
+              <p:cNvSpPr/>
+              <p:nvPr/>
+            </p:nvSpPr>
+            <p:spPr>
+              <a:xfrm>
+                <a:off x="15689491" y="1819340"/>
+                <a:ext cx="985983" cy="827314"/>
+              </a:xfrm>
+              <a:prstGeom prst="rect">
+                <a:avLst/>
+              </a:prstGeom>
+              <a:pattFill prst="diagBrick">
+                <a:fgClr>
+                  <a:schemeClr val="accent3"/>
+                </a:fgClr>
+                <a:bgClr>
+                  <a:schemeClr val="bg1"/>
+                </a:bgClr>
+              </a:pattFill>
+            </p:spPr>
+            <p:style>
+              <a:lnRef idx="2">
+                <a:schemeClr val="accent3">
+                  <a:shade val="50000"/>
+                </a:schemeClr>
+              </a:lnRef>
+              <a:fillRef idx="1">
+                <a:schemeClr val="accent3"/>
+              </a:fillRef>
+              <a:effectRef idx="0">
+                <a:schemeClr val="accent3"/>
+              </a:effectRef>
+              <a:fontRef idx="minor">
+                <a:schemeClr val="lt1"/>
+              </a:fontRef>
+            </p:style>
+            <p:txBody>
+              <a:bodyPr rot="0" spcFirstLastPara="0" vertOverflow="overflow" horzOverflow="overflow" vert="horz" wrap="square" lIns="91440" tIns="45720" rIns="91440" bIns="45720" numCol="1" spcCol="0" rtlCol="0" fromWordArt="0" anchor="ctr" anchorCtr="0" forceAA="0" compatLnSpc="1">
+                <a:prstTxWarp prst="textNoShape">
+                  <a:avLst/>
+                </a:prstTxWarp>
+                <a:noAutofit/>
+              </a:bodyPr>
+              <a:lstStyle/>
+              <a:p>
+                <a:pPr algn="ctr"/>
+                <a:endParaRPr lang="en-US"/>
+              </a:p>
+            </p:txBody>
+          </p:sp>
+          <p:sp>
+            <p:nvSpPr>
+              <p:cNvPr id="6" name="TextBox 5"/>
+              <p:cNvSpPr txBox="1"/>
+              <p:nvPr/>
+            </p:nvSpPr>
+            <p:spPr>
+              <a:xfrm>
+                <a:off x="16986299" y="2063959"/>
+                <a:ext cx="1838965" cy="369332"/>
+              </a:xfrm>
+              <a:prstGeom prst="rect">
+                <a:avLst/>
+              </a:prstGeom>
+              <a:noFill/>
+            </p:spPr>
+            <p:txBody>
+              <a:bodyPr wrap="none" rtlCol="0">
+                <a:spAutoFit/>
+              </a:bodyPr>
+              <a:lstStyle/>
+              <a:p>
+                <a:r>
+                  <a:rPr lang="en-US" dirty="0">
+                    <a:latin typeface="Courier New" panose="02070309020205020404" pitchFamily="49" charset="0"/>
+                    <a:cs typeface="Courier New" panose="02070309020205020404" pitchFamily="49" charset="0"/>
+                  </a:rPr>
+                  <a:t>LSTM LAYER 2</a:t>
+                </a:r>
+              </a:p>
+            </p:txBody>
+          </p:sp>
+          <p:sp>
+            <p:nvSpPr>
+              <p:cNvPr id="7" name="TextBox 6"/>
+              <p:cNvSpPr txBox="1"/>
+              <p:nvPr/>
+            </p:nvSpPr>
+            <p:spPr>
+              <a:xfrm>
+                <a:off x="17008184" y="3669082"/>
+                <a:ext cx="1701107" cy="369332"/>
+              </a:xfrm>
+              <a:prstGeom prst="rect">
+                <a:avLst/>
+              </a:prstGeom>
+              <a:noFill/>
+            </p:spPr>
+            <p:txBody>
+              <a:bodyPr wrap="none" rtlCol="0">
+                <a:spAutoFit/>
+              </a:bodyPr>
+              <a:lstStyle/>
+              <a:p>
+                <a:r>
+                  <a:rPr lang="en-US" dirty="0">
+                    <a:latin typeface="Courier New" panose="02070309020205020404" pitchFamily="49" charset="0"/>
+                    <a:cs typeface="Courier New" panose="02070309020205020404" pitchFamily="49" charset="0"/>
+                  </a:rPr>
+                  <a:t>MERGE LAYER</a:t>
+                </a:r>
+              </a:p>
+            </p:txBody>
+          </p:sp>
+          <p:sp>
+            <p:nvSpPr>
+              <p:cNvPr id="8" name="TextBox 7"/>
+              <p:cNvSpPr txBox="1"/>
+              <p:nvPr/>
+            </p:nvSpPr>
+            <p:spPr>
+              <a:xfrm>
+                <a:off x="16917367" y="613650"/>
+                <a:ext cx="1011815" cy="369332"/>
+              </a:xfrm>
+              <a:prstGeom prst="rect">
+                <a:avLst/>
+              </a:prstGeom>
+              <a:noFill/>
+            </p:spPr>
+            <p:txBody>
+              <a:bodyPr wrap="none" rtlCol="0">
+                <a:spAutoFit/>
+              </a:bodyPr>
+              <a:lstStyle/>
+              <a:p>
+                <a:r>
+                  <a:rPr lang="en-US" dirty="0">
+                    <a:latin typeface="Courier New" panose="02070309020205020404" pitchFamily="49" charset="0"/>
+                    <a:cs typeface="Courier New" panose="02070309020205020404" pitchFamily="49" charset="0"/>
+                  </a:rPr>
+                  <a:t>OUTPUT</a:t>
+                </a:r>
+              </a:p>
+            </p:txBody>
+          </p:sp>
+          <p:sp>
+            <p:nvSpPr>
+              <p:cNvPr id="9" name="TextBox 8"/>
+              <p:cNvSpPr txBox="1"/>
+              <p:nvPr/>
+            </p:nvSpPr>
+            <p:spPr>
+              <a:xfrm>
+                <a:off x="9753684" y="686952"/>
+                <a:ext cx="736099" cy="369332"/>
+              </a:xfrm>
+              <a:prstGeom prst="rect">
+                <a:avLst/>
+              </a:prstGeom>
+              <a:noFill/>
+            </p:spPr>
+            <p:txBody>
+              <a:bodyPr wrap="none" rtlCol="0">
+                <a:spAutoFit/>
+              </a:bodyPr>
+              <a:lstStyle/>
+              <a:p>
+                <a:r>
+                  <a:rPr lang="en-US" dirty="0">
+                    <a:latin typeface="Courier New" panose="02070309020205020404" pitchFamily="49" charset="0"/>
+                    <a:cs typeface="Courier New" panose="02070309020205020404" pitchFamily="49" charset="0"/>
+                  </a:rPr>
+                  <a:t>H(1)</a:t>
+                </a:r>
+              </a:p>
+            </p:txBody>
+          </p:sp>
+          <p:sp>
+            <p:nvSpPr>
+              <p:cNvPr id="10" name="TextBox 9"/>
+              <p:cNvSpPr txBox="1"/>
+              <p:nvPr/>
+            </p:nvSpPr>
+            <p:spPr>
+              <a:xfrm>
+                <a:off x="16131808" y="2836942"/>
+                <a:ext cx="736100" cy="369332"/>
+              </a:xfrm>
+              <a:prstGeom prst="rect">
+                <a:avLst/>
+              </a:prstGeom>
+              <a:noFill/>
+            </p:spPr>
+            <p:txBody>
+              <a:bodyPr wrap="none" rtlCol="0">
+                <a:spAutoFit/>
+              </a:bodyPr>
+              <a:lstStyle/>
+              <a:p>
+                <a:pPr algn="ctr"/>
+                <a:r>
+                  <a:rPr lang="en-US" dirty="0">
+                    <a:latin typeface="Courier New" panose="02070309020205020404" pitchFamily="49" charset="0"/>
+                    <a:cs typeface="Courier New" panose="02070309020205020404" pitchFamily="49" charset="0"/>
+                  </a:rPr>
+                  <a:t>X(t)</a:t>
+                </a:r>
+              </a:p>
+            </p:txBody>
+          </p:sp>
+          <p:sp>
+            <p:nvSpPr>
+              <p:cNvPr id="11" name="TextBox 10"/>
+              <p:cNvSpPr txBox="1"/>
+              <p:nvPr/>
+            </p:nvSpPr>
+            <p:spPr>
+              <a:xfrm>
+                <a:off x="14223844" y="2836942"/>
+                <a:ext cx="736100" cy="369332"/>
+              </a:xfrm>
+              <a:prstGeom prst="rect">
+                <a:avLst/>
+              </a:prstGeom>
+              <a:noFill/>
+            </p:spPr>
+            <p:txBody>
+              <a:bodyPr wrap="none" rtlCol="0">
+                <a:spAutoFit/>
+              </a:bodyPr>
+              <a:lstStyle/>
+              <a:p>
+                <a:pPr algn="ctr"/>
+                <a:r>
+                  <a:rPr lang="en-US" dirty="0">
+                    <a:latin typeface="Courier New" panose="02070309020205020404" pitchFamily="49" charset="0"/>
+                    <a:cs typeface="Courier New" panose="02070309020205020404" pitchFamily="49" charset="0"/>
+                  </a:rPr>
+                  <a:t>X(3)</a:t>
+                </a:r>
+              </a:p>
+            </p:txBody>
+          </p:sp>
+          <p:sp>
+            <p:nvSpPr>
+              <p:cNvPr id="12" name="TextBox 11"/>
+              <p:cNvSpPr txBox="1"/>
+              <p:nvPr/>
+            </p:nvSpPr>
+            <p:spPr>
+              <a:xfrm>
+                <a:off x="12141102" y="2836942"/>
+                <a:ext cx="736100" cy="369332"/>
+              </a:xfrm>
+              <a:prstGeom prst="rect">
+                <a:avLst/>
+              </a:prstGeom>
+              <a:noFill/>
+            </p:spPr>
+            <p:txBody>
+              <a:bodyPr wrap="none" rtlCol="0">
+                <a:spAutoFit/>
+              </a:bodyPr>
+              <a:lstStyle/>
+              <a:p>
+                <a:pPr algn="ctr"/>
+                <a:r>
+                  <a:rPr lang="en-US" dirty="0">
+                    <a:latin typeface="Courier New" panose="02070309020205020404" pitchFamily="49" charset="0"/>
+                    <a:cs typeface="Courier New" panose="02070309020205020404" pitchFamily="49" charset="0"/>
+                  </a:rPr>
+                  <a:t>X(2)</a:t>
+                </a:r>
+              </a:p>
+            </p:txBody>
+          </p:sp>
+          <p:sp>
+            <p:nvSpPr>
+              <p:cNvPr id="13" name="TextBox 12"/>
+              <p:cNvSpPr txBox="1"/>
+              <p:nvPr/>
+            </p:nvSpPr>
+            <p:spPr>
+              <a:xfrm>
+                <a:off x="10071061" y="2836942"/>
+                <a:ext cx="736100" cy="369332"/>
+              </a:xfrm>
+              <a:prstGeom prst="rect">
+                <a:avLst/>
+              </a:prstGeom>
+              <a:noFill/>
+            </p:spPr>
+            <p:txBody>
+              <a:bodyPr wrap="none" rtlCol="0">
+                <a:spAutoFit/>
+              </a:bodyPr>
+              <a:lstStyle/>
+              <a:p>
+                <a:pPr algn="ctr"/>
+                <a:r>
+                  <a:rPr lang="en-US" dirty="0">
+                    <a:latin typeface="Courier New" panose="02070309020205020404" pitchFamily="49" charset="0"/>
+                    <a:cs typeface="Courier New" panose="02070309020205020404" pitchFamily="49" charset="0"/>
+                  </a:rPr>
+                  <a:t>X(1)</a:t>
+                </a:r>
+              </a:p>
+            </p:txBody>
+          </p:sp>
+          <p:sp>
+            <p:nvSpPr>
+              <p:cNvPr id="14" name="TextBox 13"/>
+              <p:cNvSpPr txBox="1"/>
+              <p:nvPr/>
+            </p:nvSpPr>
+            <p:spPr>
+              <a:xfrm>
+                <a:off x="11823726" y="614594"/>
+                <a:ext cx="736099" cy="369332"/>
+              </a:xfrm>
+              <a:prstGeom prst="rect">
+                <a:avLst/>
+              </a:prstGeom>
+              <a:noFill/>
+            </p:spPr>
+            <p:txBody>
+              <a:bodyPr wrap="none" rtlCol="0">
+                <a:spAutoFit/>
+              </a:bodyPr>
+              <a:lstStyle/>
+              <a:p>
+                <a:r>
+                  <a:rPr lang="en-US" dirty="0">
+                    <a:latin typeface="Courier New" panose="02070309020205020404" pitchFamily="49" charset="0"/>
+                    <a:cs typeface="Courier New" panose="02070309020205020404" pitchFamily="49" charset="0"/>
+                  </a:rPr>
+                  <a:t>H(2)</a:t>
+                </a:r>
+              </a:p>
+            </p:txBody>
+          </p:sp>
+          <p:sp>
+            <p:nvSpPr>
+              <p:cNvPr id="15" name="TextBox 14"/>
+              <p:cNvSpPr txBox="1"/>
+              <p:nvPr/>
+            </p:nvSpPr>
+            <p:spPr>
+              <a:xfrm>
+                <a:off x="13893768" y="613650"/>
+                <a:ext cx="736099" cy="369332"/>
+              </a:xfrm>
+              <a:prstGeom prst="rect">
+                <a:avLst/>
+              </a:prstGeom>
+              <a:noFill/>
+            </p:spPr>
+            <p:txBody>
+              <a:bodyPr wrap="none" rtlCol="0">
+                <a:spAutoFit/>
+              </a:bodyPr>
+              <a:lstStyle/>
+              <a:p>
+                <a:r>
+                  <a:rPr lang="en-US" dirty="0">
+                    <a:latin typeface="Courier New" panose="02070309020205020404" pitchFamily="49" charset="0"/>
+                    <a:cs typeface="Courier New" panose="02070309020205020404" pitchFamily="49" charset="0"/>
+                  </a:rPr>
+                  <a:t>H(3)</a:t>
+                </a:r>
+              </a:p>
+            </p:txBody>
+          </p:sp>
+          <p:sp>
+            <p:nvSpPr>
+              <p:cNvPr id="16" name="TextBox 15"/>
+              <p:cNvSpPr txBox="1"/>
+              <p:nvPr/>
+            </p:nvSpPr>
+            <p:spPr>
+              <a:xfrm>
+                <a:off x="15853793" y="613650"/>
+                <a:ext cx="736099" cy="369332"/>
+              </a:xfrm>
+              <a:prstGeom prst="rect">
+                <a:avLst/>
+              </a:prstGeom>
+              <a:noFill/>
+            </p:spPr>
+            <p:txBody>
+              <a:bodyPr wrap="none" rtlCol="0">
+                <a:spAutoFit/>
+              </a:bodyPr>
+              <a:lstStyle/>
+              <a:p>
+                <a:r>
+                  <a:rPr lang="en-US" dirty="0">
+                    <a:latin typeface="Courier New" panose="02070309020205020404" pitchFamily="49" charset="0"/>
+                    <a:cs typeface="Courier New" panose="02070309020205020404" pitchFamily="49" charset="0"/>
+                  </a:rPr>
+                  <a:t>H(t)</a:t>
+                </a:r>
+              </a:p>
+            </p:txBody>
+          </p:sp>
+          <p:sp>
+            <p:nvSpPr>
+              <p:cNvPr id="17" name="TextBox 16"/>
+              <p:cNvSpPr txBox="1"/>
+              <p:nvPr/>
+            </p:nvSpPr>
+            <p:spPr>
+              <a:xfrm>
+                <a:off x="10691879" y="1677230"/>
+                <a:ext cx="736099" cy="369332"/>
+              </a:xfrm>
+              <a:prstGeom prst="rect">
+                <a:avLst/>
+              </a:prstGeom>
+              <a:noFill/>
+            </p:spPr>
+            <p:txBody>
+              <a:bodyPr wrap="none" rtlCol="0">
+                <a:spAutoFit/>
+              </a:bodyPr>
+              <a:lstStyle/>
+              <a:p>
+                <a:r>
+                  <a:rPr lang="en-US" dirty="0">
+                    <a:latin typeface="Courier New" panose="02070309020205020404" pitchFamily="49" charset="0"/>
+                    <a:cs typeface="Courier New" panose="02070309020205020404" pitchFamily="49" charset="0"/>
+                  </a:rPr>
+                  <a:t>M(1)</a:t>
+                </a:r>
+              </a:p>
+            </p:txBody>
+          </p:sp>
+          <p:sp>
+            <p:nvSpPr>
+              <p:cNvPr id="18" name="TextBox 17"/>
+              <p:cNvSpPr txBox="1"/>
+              <p:nvPr/>
+            </p:nvSpPr>
+            <p:spPr>
+              <a:xfrm>
+                <a:off x="12761607" y="1635331"/>
+                <a:ext cx="736099" cy="369332"/>
+              </a:xfrm>
+              <a:prstGeom prst="rect">
+                <a:avLst/>
+              </a:prstGeom>
+              <a:noFill/>
+            </p:spPr>
+            <p:txBody>
+              <a:bodyPr wrap="none" rtlCol="0">
+                <a:spAutoFit/>
+              </a:bodyPr>
+              <a:lstStyle/>
+              <a:p>
+                <a:r>
+                  <a:rPr lang="en-US" dirty="0">
+                    <a:latin typeface="Courier New" panose="02070309020205020404" pitchFamily="49" charset="0"/>
+                    <a:cs typeface="Courier New" panose="02070309020205020404" pitchFamily="49" charset="0"/>
+                  </a:rPr>
+                  <a:t>M(2)</a:t>
+                </a:r>
+              </a:p>
+            </p:txBody>
+          </p:sp>
+          <p:sp>
+            <p:nvSpPr>
+              <p:cNvPr id="19" name="TextBox 18"/>
+              <p:cNvSpPr txBox="1"/>
+              <p:nvPr/>
+            </p:nvSpPr>
+            <p:spPr>
+              <a:xfrm>
+                <a:off x="12755761" y="2501034"/>
+                <a:ext cx="736099" cy="369332"/>
+              </a:xfrm>
+              <a:prstGeom prst="rect">
+                <a:avLst/>
+              </a:prstGeom>
+              <a:noFill/>
+            </p:spPr>
+            <p:txBody>
+              <a:bodyPr wrap="none" rtlCol="0">
+                <a:spAutoFit/>
+              </a:bodyPr>
+              <a:lstStyle/>
+              <a:p>
+                <a:r>
+                  <a:rPr lang="en-US" dirty="0">
+                    <a:latin typeface="Courier New" panose="02070309020205020404" pitchFamily="49" charset="0"/>
+                    <a:cs typeface="Courier New" panose="02070309020205020404" pitchFamily="49" charset="0"/>
+                  </a:rPr>
+                  <a:t>H(2)</a:t>
+                </a:r>
+              </a:p>
+            </p:txBody>
+          </p:sp>
+          <p:sp>
+            <p:nvSpPr>
+              <p:cNvPr id="20" name="TextBox 19"/>
+              <p:cNvSpPr txBox="1"/>
+              <p:nvPr/>
+            </p:nvSpPr>
+            <p:spPr>
+              <a:xfrm>
+                <a:off x="10688994" y="2424237"/>
+                <a:ext cx="736099" cy="369332"/>
+              </a:xfrm>
+              <a:prstGeom prst="rect">
+                <a:avLst/>
+              </a:prstGeom>
+              <a:noFill/>
+            </p:spPr>
+            <p:txBody>
+              <a:bodyPr wrap="none" rtlCol="0">
+                <a:spAutoFit/>
+              </a:bodyPr>
+              <a:lstStyle/>
+              <a:p>
+                <a:r>
+                  <a:rPr lang="en-US" dirty="0">
+                    <a:latin typeface="Courier New" panose="02070309020205020404" pitchFamily="49" charset="0"/>
+                    <a:cs typeface="Courier New" panose="02070309020205020404" pitchFamily="49" charset="0"/>
+                  </a:rPr>
+                  <a:t>H(1)</a:t>
+                </a:r>
+              </a:p>
+            </p:txBody>
+          </p:sp>
+          <p:sp>
+            <p:nvSpPr>
+              <p:cNvPr id="246" name="TextBox 245"/>
+              <p:cNvSpPr txBox="1"/>
+              <p:nvPr/>
+            </p:nvSpPr>
+            <p:spPr>
+              <a:xfrm>
+                <a:off x="12598463" y="6853885"/>
+                <a:ext cx="1838965" cy="369332"/>
+              </a:xfrm>
+              <a:prstGeom prst="rect">
+                <a:avLst/>
+              </a:prstGeom>
+              <a:noFill/>
+            </p:spPr>
+            <p:txBody>
+              <a:bodyPr wrap="none" rtlCol="0">
+                <a:spAutoFit/>
+              </a:bodyPr>
+              <a:lstStyle/>
+              <a:p>
+                <a:r>
+                  <a:rPr lang="en-US" dirty="0">
+                    <a:latin typeface="Courier New" panose="02070309020205020404" pitchFamily="49" charset="0"/>
+                    <a:cs typeface="Courier New" panose="02070309020205020404" pitchFamily="49" charset="0"/>
+                  </a:rPr>
+                  <a:t>LSTM LAYER 1</a:t>
+                </a:r>
+              </a:p>
+            </p:txBody>
+          </p:sp>
+        </p:grpSp>
+        <p:grpSp>
+          <p:nvGrpSpPr>
+            <p:cNvPr id="39" name="Group 38"/>
+            <p:cNvGrpSpPr/>
+            <p:nvPr/>
+          </p:nvGrpSpPr>
+          <p:grpSpPr>
+            <a:xfrm>
+              <a:off x="7269534" y="5081083"/>
+              <a:ext cx="7754087" cy="3000999"/>
+              <a:chOff x="147579" y="2654866"/>
+              <a:chExt cx="7754087" cy="3000999"/>
+            </a:xfrm>
+          </p:grpSpPr>
+          <p:grpSp>
+            <p:nvGrpSpPr>
+              <p:cNvPr id="40" name="Group 39"/>
+              <p:cNvGrpSpPr/>
+              <p:nvPr/>
+            </p:nvGrpSpPr>
+            <p:grpSpPr>
+              <a:xfrm>
+                <a:off x="722416" y="3284396"/>
+                <a:ext cx="7097405" cy="1488100"/>
+                <a:chOff x="2309916" y="3258996"/>
+                <a:chExt cx="7097405" cy="1488100"/>
+              </a:xfrm>
+            </p:grpSpPr>
+            <p:grpSp>
+              <p:nvGrpSpPr>
+                <p:cNvPr id="56" name="Group 55"/>
+                <p:cNvGrpSpPr/>
+                <p:nvPr/>
+              </p:nvGrpSpPr>
+              <p:grpSpPr>
+                <a:xfrm>
+                  <a:off x="2802908" y="3473076"/>
+                  <a:ext cx="6111422" cy="1274020"/>
+                  <a:chOff x="2024743" y="3813622"/>
+                  <a:chExt cx="6111422" cy="1274020"/>
+                </a:xfrm>
+              </p:grpSpPr>
+              <p:cxnSp>
+                <p:nvCxnSpPr>
+                  <p:cNvPr id="62" name="Straight Arrow Connector 61"/>
+                  <p:cNvCxnSpPr>
+                    <a:endCxn id="57" idx="2"/>
+                  </p:cNvCxnSpPr>
+                  <p:nvPr/>
+                </p:nvCxnSpPr>
+                <p:spPr>
+                  <a:xfrm flipV="1">
+                    <a:off x="2024743" y="4458112"/>
+                    <a:ext cx="0" cy="629530"/>
+                  </a:xfrm>
+                  <a:prstGeom prst="straightConnector1">
+                    <a:avLst/>
+                  </a:prstGeom>
+                  <a:ln w="38100">
+                    <a:solidFill>
+                      <a:srgbClr val="00B0F0"/>
+                    </a:solidFill>
+                    <a:tailEnd type="triangle"/>
+                  </a:ln>
+                </p:spPr>
+                <p:style>
+                  <a:lnRef idx="3">
+                    <a:schemeClr val="accent1"/>
+                  </a:lnRef>
+                  <a:fillRef idx="0">
+                    <a:schemeClr val="accent1"/>
+                  </a:fillRef>
+                  <a:effectRef idx="2">
+                    <a:schemeClr val="accent1"/>
+                  </a:effectRef>
+                  <a:fontRef idx="minor">
+                    <a:schemeClr val="tx1"/>
+                  </a:fontRef>
+                </p:style>
+              </p:cxnSp>
+              <p:cxnSp>
+                <p:nvCxnSpPr>
+                  <p:cNvPr id="64" name="Straight Arrow Connector 63"/>
+                  <p:cNvCxnSpPr>
+                    <a:endCxn id="58" idx="2"/>
+                  </p:cNvCxnSpPr>
+                  <p:nvPr/>
+                </p:nvCxnSpPr>
+                <p:spPr>
+                  <a:xfrm flipV="1">
+                    <a:off x="4070351" y="4426856"/>
+                    <a:ext cx="0" cy="629530"/>
+                  </a:xfrm>
+                  <a:prstGeom prst="straightConnector1">
+                    <a:avLst/>
+                  </a:prstGeom>
+                  <a:ln w="38100">
+                    <a:solidFill>
+                      <a:srgbClr val="00B0F0"/>
+                    </a:solidFill>
+                    <a:tailEnd type="triangle"/>
+                  </a:ln>
+                </p:spPr>
+                <p:style>
+                  <a:lnRef idx="3">
+                    <a:schemeClr val="accent1"/>
+                  </a:lnRef>
+                  <a:fillRef idx="0">
+                    <a:schemeClr val="accent1"/>
+                  </a:fillRef>
+                  <a:effectRef idx="2">
+                    <a:schemeClr val="accent1"/>
+                  </a:effectRef>
+                  <a:fontRef idx="minor">
+                    <a:schemeClr val="tx1"/>
+                  </a:fontRef>
+                </p:style>
+              </p:cxnSp>
+              <p:cxnSp>
+                <p:nvCxnSpPr>
+                  <p:cNvPr id="66" name="Straight Arrow Connector 65"/>
+                  <p:cNvCxnSpPr>
+                    <a:endCxn id="59" idx="2"/>
+                  </p:cNvCxnSpPr>
+                  <p:nvPr/>
+                </p:nvCxnSpPr>
+                <p:spPr>
+                  <a:xfrm flipV="1">
+                    <a:off x="6103258" y="4426856"/>
+                    <a:ext cx="0" cy="629530"/>
+                  </a:xfrm>
+                  <a:prstGeom prst="straightConnector1">
+                    <a:avLst/>
+                  </a:prstGeom>
+                  <a:ln w="38100">
+                    <a:solidFill>
+                      <a:srgbClr val="00B0F0"/>
+                    </a:solidFill>
+                    <a:tailEnd type="triangle"/>
+                  </a:ln>
+                </p:spPr>
+                <p:style>
+                  <a:lnRef idx="3">
+                    <a:schemeClr val="accent1"/>
+                  </a:lnRef>
+                  <a:fillRef idx="0">
+                    <a:schemeClr val="accent1"/>
+                  </a:fillRef>
+                  <a:effectRef idx="2">
+                    <a:schemeClr val="accent1"/>
+                  </a:effectRef>
+                  <a:fontRef idx="minor">
+                    <a:schemeClr val="tx1"/>
+                  </a:fontRef>
+                </p:style>
+              </p:cxnSp>
+              <p:cxnSp>
+                <p:nvCxnSpPr>
+                  <p:cNvPr id="68" name="Straight Arrow Connector 67"/>
+                  <p:cNvCxnSpPr>
+                    <a:endCxn id="60" idx="2"/>
+                  </p:cNvCxnSpPr>
+                  <p:nvPr/>
+                </p:nvCxnSpPr>
+                <p:spPr>
+                  <a:xfrm flipV="1">
+                    <a:off x="8136165" y="4426856"/>
+                    <a:ext cx="0" cy="629530"/>
+                  </a:xfrm>
+                  <a:prstGeom prst="straightConnector1">
+                    <a:avLst/>
+                  </a:prstGeom>
+                  <a:ln w="38100">
+                    <a:solidFill>
+                      <a:srgbClr val="00B0F0"/>
+                    </a:solidFill>
+                    <a:tailEnd type="triangle"/>
+                  </a:ln>
+                </p:spPr>
+                <p:style>
+                  <a:lnRef idx="3">
+                    <a:schemeClr val="accent1"/>
+                  </a:lnRef>
+                  <a:fillRef idx="0">
+                    <a:schemeClr val="accent1"/>
+                  </a:fillRef>
+                  <a:effectRef idx="2">
+                    <a:schemeClr val="accent1"/>
+                  </a:effectRef>
+                  <a:fontRef idx="minor">
+                    <a:schemeClr val="tx1"/>
+                  </a:fontRef>
+                </p:style>
+              </p:cxnSp>
+              <p:cxnSp>
+                <p:nvCxnSpPr>
+                  <p:cNvPr id="69" name="Straight Arrow Connector 68"/>
+                  <p:cNvCxnSpPr/>
+                  <p:nvPr/>
+                </p:nvCxnSpPr>
+                <p:spPr>
+                  <a:xfrm>
+                    <a:off x="2517734" y="3844161"/>
+                    <a:ext cx="1059625" cy="0"/>
+                  </a:xfrm>
+                  <a:prstGeom prst="straightConnector1">
+                    <a:avLst/>
+                  </a:prstGeom>
+                  <a:ln w="38100">
+                    <a:solidFill>
+                      <a:srgbClr val="00B0F0"/>
+                    </a:solidFill>
+                    <a:tailEnd type="triangle"/>
+                  </a:ln>
+                </p:spPr>
+                <p:style>
+                  <a:lnRef idx="3">
+                    <a:schemeClr val="accent1"/>
+                  </a:lnRef>
+                  <a:fillRef idx="0">
+                    <a:schemeClr val="accent1"/>
+                  </a:fillRef>
+                  <a:effectRef idx="2">
+                    <a:schemeClr val="accent1"/>
+                  </a:effectRef>
+                  <a:fontRef idx="minor">
+                    <a:schemeClr val="tx1"/>
+                  </a:fontRef>
+                </p:style>
+              </p:cxnSp>
+              <p:cxnSp>
+                <p:nvCxnSpPr>
+                  <p:cNvPr id="70" name="Straight Arrow Connector 69"/>
+                  <p:cNvCxnSpPr/>
+                  <p:nvPr/>
+                </p:nvCxnSpPr>
+                <p:spPr>
+                  <a:xfrm>
+                    <a:off x="4563342" y="3844161"/>
+                    <a:ext cx="1059625" cy="0"/>
+                  </a:xfrm>
+                  <a:prstGeom prst="straightConnector1">
+                    <a:avLst/>
+                  </a:prstGeom>
+                  <a:ln w="28575">
+                    <a:solidFill>
+                      <a:srgbClr val="00B0F0"/>
+                    </a:solidFill>
+                    <a:tailEnd type="triangle"/>
+                  </a:ln>
+                </p:spPr>
+                <p:style>
+                  <a:lnRef idx="1">
+                    <a:schemeClr val="dk1"/>
+                  </a:lnRef>
+                  <a:fillRef idx="0">
+                    <a:schemeClr val="dk1"/>
+                  </a:fillRef>
+                  <a:effectRef idx="0">
+                    <a:schemeClr val="dk1"/>
+                  </a:effectRef>
+                  <a:fontRef idx="minor">
+                    <a:schemeClr val="tx1"/>
+                  </a:fontRef>
+                </p:style>
+              </p:cxnSp>
+              <p:sp>
+                <p:nvSpPr>
+                  <p:cNvPr id="71" name="TextBox 70"/>
+                  <p:cNvSpPr txBox="1"/>
+                  <p:nvPr/>
+                </p:nvSpPr>
+                <p:spPr>
+                  <a:xfrm>
+                    <a:off x="6583549" y="3813622"/>
+                    <a:ext cx="1078674" cy="461665"/>
+                  </a:xfrm>
+                  <a:prstGeom prst="rect">
+                    <a:avLst/>
+                  </a:prstGeom>
+                  <a:noFill/>
+                </p:spPr>
+                <p:txBody>
+                  <a:bodyPr wrap="square" rtlCol="0">
+                    <a:spAutoFit/>
+                  </a:bodyPr>
+                  <a:lstStyle/>
+                  <a:p>
+                    <a:pPr algn="ctr"/>
+                    <a:r>
+                      <a:rPr lang="en-US" sz="2400" dirty="0">
+                        <a:latin typeface="Courier New" panose="02070309020205020404" pitchFamily="49" charset="0"/>
+                        <a:cs typeface="Courier New" panose="02070309020205020404" pitchFamily="49" charset="0"/>
+                      </a:rPr>
+                      <a:t>…………</a:t>
+                    </a:r>
+                  </a:p>
+                </p:txBody>
+              </p:sp>
+              <p:cxnSp>
+                <p:nvCxnSpPr>
+                  <p:cNvPr id="72" name="Straight Arrow Connector 71"/>
+                  <p:cNvCxnSpPr/>
+                  <p:nvPr/>
+                </p:nvCxnSpPr>
+                <p:spPr>
+                  <a:xfrm flipV="1">
+                    <a:off x="2517734" y="4195385"/>
+                    <a:ext cx="1059625" cy="18108"/>
+                  </a:xfrm>
+                  <a:prstGeom prst="straightConnector1">
+                    <a:avLst/>
+                  </a:prstGeom>
+                  <a:ln w="38100">
+                    <a:solidFill>
+                      <a:srgbClr val="00B0F0"/>
+                    </a:solidFill>
+                    <a:tailEnd type="triangle"/>
+                  </a:ln>
+                </p:spPr>
+                <p:style>
+                  <a:lnRef idx="3">
+                    <a:schemeClr val="accent1"/>
+                  </a:lnRef>
+                  <a:fillRef idx="0">
+                    <a:schemeClr val="accent1"/>
+                  </a:fillRef>
+                  <a:effectRef idx="2">
+                    <a:schemeClr val="accent1"/>
+                  </a:effectRef>
+                  <a:fontRef idx="minor">
+                    <a:schemeClr val="tx1"/>
+                  </a:fontRef>
+                </p:style>
+              </p:cxnSp>
+              <p:cxnSp>
+                <p:nvCxnSpPr>
+                  <p:cNvPr id="73" name="Straight Arrow Connector 72"/>
+                  <p:cNvCxnSpPr/>
+                  <p:nvPr/>
+                </p:nvCxnSpPr>
+                <p:spPr>
+                  <a:xfrm>
+                    <a:off x="4563342" y="4244749"/>
+                    <a:ext cx="1059625" cy="0"/>
+                  </a:xfrm>
+                  <a:prstGeom prst="straightConnector1">
+                    <a:avLst/>
+                  </a:prstGeom>
+                  <a:ln w="28575">
+                    <a:solidFill>
+                      <a:srgbClr val="00B0F0"/>
+                    </a:solidFill>
+                    <a:tailEnd type="triangle"/>
+                  </a:ln>
+                </p:spPr>
+                <p:style>
+                  <a:lnRef idx="1">
+                    <a:schemeClr val="dk1"/>
+                  </a:lnRef>
+                  <a:fillRef idx="0">
+                    <a:schemeClr val="dk1"/>
+                  </a:fillRef>
+                  <a:effectRef idx="0">
+                    <a:schemeClr val="dk1"/>
+                  </a:effectRef>
+                  <a:fontRef idx="minor">
+                    <a:schemeClr val="tx1"/>
+                  </a:fontRef>
+                </p:style>
+              </p:cxnSp>
+            </p:grpSp>
+            <p:sp>
+              <p:nvSpPr>
+                <p:cNvPr id="57" name="Rectangle 56"/>
+                <p:cNvSpPr/>
+                <p:nvPr/>
+              </p:nvSpPr>
+              <p:spPr>
+                <a:xfrm>
+                  <a:off x="2309916" y="3290252"/>
+                  <a:ext cx="985983" cy="827314"/>
+                </a:xfrm>
+                <a:prstGeom prst="rect">
+                  <a:avLst/>
+                </a:prstGeom>
+                <a:pattFill prst="ltHorz">
+                  <a:fgClr>
+                    <a:schemeClr val="accent3"/>
+                  </a:fgClr>
+                  <a:bgClr>
+                    <a:schemeClr val="bg1"/>
+                  </a:bgClr>
+                </a:pattFill>
+              </p:spPr>
+              <p:style>
+                <a:lnRef idx="2">
+                  <a:schemeClr val="accent3">
+                    <a:shade val="50000"/>
+                  </a:schemeClr>
+                </a:lnRef>
+                <a:fillRef idx="1">
+                  <a:schemeClr val="accent3"/>
+                </a:fillRef>
+                <a:effectRef idx="0">
+                  <a:schemeClr val="accent3"/>
+                </a:effectRef>
+                <a:fontRef idx="minor">
+                  <a:schemeClr val="lt1"/>
+                </a:fontRef>
+              </p:style>
+              <p:txBody>
+                <a:bodyPr rot="0" spcFirstLastPara="0" vertOverflow="overflow" horzOverflow="overflow" vert="horz" wrap="square" lIns="91440" tIns="45720" rIns="91440" bIns="45720" numCol="1" spcCol="0" rtlCol="0" fromWordArt="0" anchor="ctr" anchorCtr="0" forceAA="0" compatLnSpc="1">
+                  <a:prstTxWarp prst="textNoShape">
+                    <a:avLst/>
+                  </a:prstTxWarp>
+                  <a:noAutofit/>
+                </a:bodyPr>
+                <a:lstStyle/>
+                <a:p>
+                  <a:pPr algn="ctr"/>
+                  <a:endParaRPr lang="en-US"/>
+                </a:p>
+              </p:txBody>
+            </p:sp>
+            <p:sp>
+              <p:nvSpPr>
+                <p:cNvPr id="58" name="Rectangle 57"/>
+                <p:cNvSpPr/>
+                <p:nvPr/>
+              </p:nvSpPr>
+              <p:spPr>
+                <a:xfrm>
+                  <a:off x="4355524" y="3258996"/>
+                  <a:ext cx="985983" cy="827314"/>
+                </a:xfrm>
+                <a:prstGeom prst="rect">
+                  <a:avLst/>
+                </a:prstGeom>
+                <a:pattFill prst="ltHorz">
+                  <a:fgClr>
+                    <a:schemeClr val="accent3"/>
+                  </a:fgClr>
+                  <a:bgClr>
+                    <a:schemeClr val="bg1"/>
+                  </a:bgClr>
+                </a:pattFill>
+              </p:spPr>
+              <p:style>
+                <a:lnRef idx="2">
+                  <a:schemeClr val="accent3">
+                    <a:shade val="50000"/>
+                  </a:schemeClr>
+                </a:lnRef>
+                <a:fillRef idx="1">
+                  <a:schemeClr val="accent3"/>
+                </a:fillRef>
+                <a:effectRef idx="0">
+                  <a:schemeClr val="accent3"/>
+                </a:effectRef>
+                <a:fontRef idx="minor">
+                  <a:schemeClr val="lt1"/>
+                </a:fontRef>
+              </p:style>
+              <p:txBody>
+                <a:bodyPr rot="0" spcFirstLastPara="0" vertOverflow="overflow" horzOverflow="overflow" vert="horz" wrap="square" lIns="91440" tIns="45720" rIns="91440" bIns="45720" numCol="1" spcCol="0" rtlCol="0" fromWordArt="0" anchor="ctr" anchorCtr="0" forceAA="0" compatLnSpc="1">
+                  <a:prstTxWarp prst="textNoShape">
+                    <a:avLst/>
+                  </a:prstTxWarp>
+                  <a:noAutofit/>
+                </a:bodyPr>
+                <a:lstStyle/>
+                <a:p>
+                  <a:pPr algn="ctr"/>
+                  <a:endParaRPr lang="en-US"/>
+                </a:p>
+              </p:txBody>
+            </p:sp>
+            <p:sp>
+              <p:nvSpPr>
+                <p:cNvPr id="59" name="Rectangle 58"/>
+                <p:cNvSpPr/>
+                <p:nvPr/>
+              </p:nvSpPr>
+              <p:spPr>
+                <a:xfrm>
+                  <a:off x="6388431" y="3258996"/>
+                  <a:ext cx="985983" cy="827314"/>
+                </a:xfrm>
+                <a:prstGeom prst="rect">
+                  <a:avLst/>
+                </a:prstGeom>
+                <a:pattFill prst="ltHorz">
+                  <a:fgClr>
+                    <a:schemeClr val="accent3"/>
+                  </a:fgClr>
+                  <a:bgClr>
+                    <a:schemeClr val="bg1"/>
+                  </a:bgClr>
+                </a:pattFill>
+              </p:spPr>
+              <p:style>
+                <a:lnRef idx="2">
+                  <a:schemeClr val="accent3">
+                    <a:shade val="50000"/>
+                  </a:schemeClr>
+                </a:lnRef>
+                <a:fillRef idx="1">
+                  <a:schemeClr val="accent3"/>
+                </a:fillRef>
+                <a:effectRef idx="0">
+                  <a:schemeClr val="accent3"/>
+                </a:effectRef>
+                <a:fontRef idx="minor">
+                  <a:schemeClr val="lt1"/>
+                </a:fontRef>
+              </p:style>
+              <p:txBody>
+                <a:bodyPr rot="0" spcFirstLastPara="0" vertOverflow="overflow" horzOverflow="overflow" vert="horz" wrap="square" lIns="91440" tIns="45720" rIns="91440" bIns="45720" numCol="1" spcCol="0" rtlCol="0" fromWordArt="0" anchor="ctr" anchorCtr="0" forceAA="0" compatLnSpc="1">
+                  <a:prstTxWarp prst="textNoShape">
+                    <a:avLst/>
+                  </a:prstTxWarp>
+                  <a:noAutofit/>
+                </a:bodyPr>
+                <a:lstStyle/>
+                <a:p>
+                  <a:pPr algn="ctr"/>
+                  <a:endParaRPr lang="en-US"/>
+                </a:p>
+              </p:txBody>
+            </p:sp>
+            <p:sp>
+              <p:nvSpPr>
+                <p:cNvPr id="60" name="Rectangle 59"/>
+                <p:cNvSpPr/>
+                <p:nvPr/>
+              </p:nvSpPr>
+              <p:spPr>
+                <a:xfrm>
+                  <a:off x="8421338" y="3258996"/>
+                  <a:ext cx="985983" cy="827314"/>
+                </a:xfrm>
+                <a:prstGeom prst="rect">
+                  <a:avLst/>
+                </a:prstGeom>
+                <a:pattFill prst="ltHorz">
+                  <a:fgClr>
+                    <a:schemeClr val="accent3"/>
+                  </a:fgClr>
+                  <a:bgClr>
+                    <a:schemeClr val="bg1"/>
+                  </a:bgClr>
+                </a:pattFill>
+              </p:spPr>
+              <p:style>
+                <a:lnRef idx="2">
+                  <a:schemeClr val="accent3">
+                    <a:shade val="50000"/>
+                  </a:schemeClr>
+                </a:lnRef>
+                <a:fillRef idx="1">
+                  <a:schemeClr val="accent3"/>
+                </a:fillRef>
+                <a:effectRef idx="0">
+                  <a:schemeClr val="accent3"/>
+                </a:effectRef>
+                <a:fontRef idx="minor">
+                  <a:schemeClr val="lt1"/>
+                </a:fontRef>
+              </p:style>
+              <p:txBody>
+                <a:bodyPr rot="0" spcFirstLastPara="0" vertOverflow="overflow" horzOverflow="overflow" vert="horz" wrap="square" lIns="91440" tIns="45720" rIns="91440" bIns="45720" numCol="1" spcCol="0" rtlCol="0" fromWordArt="0" anchor="ctr" anchorCtr="0" forceAA="0" compatLnSpc="1">
+                  <a:prstTxWarp prst="textNoShape">
+                    <a:avLst/>
+                  </a:prstTxWarp>
+                  <a:noAutofit/>
+                </a:bodyPr>
+                <a:lstStyle/>
+                <a:p>
+                  <a:pPr algn="ctr"/>
+                  <a:endParaRPr lang="en-US"/>
+                </a:p>
+              </p:txBody>
+            </p:sp>
+          </p:grpSp>
+          <p:sp>
+            <p:nvSpPr>
+              <p:cNvPr id="45" name="TextBox 44"/>
+              <p:cNvSpPr txBox="1"/>
+              <p:nvPr/>
+            </p:nvSpPr>
+            <p:spPr>
+              <a:xfrm>
+                <a:off x="6751992" y="4874766"/>
+                <a:ext cx="1149674" cy="369332"/>
+              </a:xfrm>
+              <a:prstGeom prst="rect">
+                <a:avLst/>
+              </a:prstGeom>
+              <a:noFill/>
+            </p:spPr>
+            <p:txBody>
+              <a:bodyPr wrap="none" rtlCol="0">
+                <a:spAutoFit/>
+              </a:bodyPr>
+              <a:lstStyle/>
+              <a:p>
+                <a:pPr algn="ctr"/>
+                <a:r>
+                  <a:rPr lang="en-US" dirty="0">
+                    <a:latin typeface="Courier New" panose="02070309020205020404" pitchFamily="49" charset="0"/>
+                    <a:cs typeface="Courier New" panose="02070309020205020404" pitchFamily="49" charset="0"/>
+                  </a:rPr>
+                  <a:t>x(1)(t)</a:t>
+                </a:r>
+              </a:p>
+            </p:txBody>
+          </p:sp>
+          <p:sp>
+            <p:nvSpPr>
+              <p:cNvPr id="46" name="TextBox 45"/>
+              <p:cNvSpPr txBox="1"/>
+              <p:nvPr/>
+            </p:nvSpPr>
+            <p:spPr>
+              <a:xfrm>
+                <a:off x="4844027" y="4874766"/>
+                <a:ext cx="1149674" cy="369332"/>
+              </a:xfrm>
+              <a:prstGeom prst="rect">
+                <a:avLst/>
+              </a:prstGeom>
+              <a:noFill/>
+            </p:spPr>
+            <p:txBody>
+              <a:bodyPr wrap="none" rtlCol="0">
+                <a:spAutoFit/>
+              </a:bodyPr>
+              <a:lstStyle/>
+              <a:p>
+                <a:pPr algn="ctr"/>
+                <a:r>
+                  <a:rPr lang="en-US" dirty="0">
+                    <a:latin typeface="Courier New" panose="02070309020205020404" pitchFamily="49" charset="0"/>
+                    <a:cs typeface="Courier New" panose="02070309020205020404" pitchFamily="49" charset="0"/>
+                  </a:rPr>
+                  <a:t>x(1)(3)</a:t>
+                </a:r>
+              </a:p>
+            </p:txBody>
+          </p:sp>
+          <p:sp>
+            <p:nvSpPr>
+              <p:cNvPr id="47" name="TextBox 46"/>
+              <p:cNvSpPr txBox="1"/>
+              <p:nvPr/>
+            </p:nvSpPr>
+            <p:spPr>
+              <a:xfrm>
+                <a:off x="2761285" y="4874766"/>
+                <a:ext cx="1149674" cy="369332"/>
+              </a:xfrm>
+              <a:prstGeom prst="rect">
+                <a:avLst/>
+              </a:prstGeom>
+              <a:noFill/>
+            </p:spPr>
+            <p:txBody>
+              <a:bodyPr wrap="none" rtlCol="0">
+                <a:spAutoFit/>
+              </a:bodyPr>
+              <a:lstStyle/>
+              <a:p>
+                <a:pPr algn="ctr"/>
+                <a:r>
+                  <a:rPr lang="en-US" dirty="0">
+                    <a:latin typeface="Courier New" panose="02070309020205020404" pitchFamily="49" charset="0"/>
+                    <a:cs typeface="Courier New" panose="02070309020205020404" pitchFamily="49" charset="0"/>
+                  </a:rPr>
+                  <a:t>x(1)(2)</a:t>
+                </a:r>
+              </a:p>
+            </p:txBody>
+          </p:sp>
+          <p:sp>
+            <p:nvSpPr>
+              <p:cNvPr id="48" name="TextBox 47"/>
+              <p:cNvSpPr txBox="1"/>
+              <p:nvPr/>
+            </p:nvSpPr>
+            <p:spPr>
+              <a:xfrm>
+                <a:off x="691245" y="4874766"/>
+                <a:ext cx="1149674" cy="369332"/>
+              </a:xfrm>
+              <a:prstGeom prst="rect">
+                <a:avLst/>
+              </a:prstGeom>
+              <a:noFill/>
+            </p:spPr>
+            <p:txBody>
+              <a:bodyPr wrap="none" rtlCol="0">
+                <a:spAutoFit/>
+              </a:bodyPr>
+              <a:lstStyle/>
+              <a:p>
+                <a:pPr algn="ctr"/>
+                <a:r>
+                  <a:rPr lang="en-US" dirty="0">
+                    <a:latin typeface="Courier New" panose="02070309020205020404" pitchFamily="49" charset="0"/>
+                    <a:cs typeface="Courier New" panose="02070309020205020404" pitchFamily="49" charset="0"/>
+                  </a:rPr>
+                  <a:t>x(1)(1)</a:t>
+                </a:r>
+              </a:p>
+            </p:txBody>
+          </p:sp>
+          <p:sp>
+            <p:nvSpPr>
+              <p:cNvPr id="52" name="TextBox 51"/>
+              <p:cNvSpPr txBox="1"/>
+              <p:nvPr/>
+            </p:nvSpPr>
+            <p:spPr>
+              <a:xfrm>
+                <a:off x="1701152" y="3145007"/>
+                <a:ext cx="1149674" cy="369332"/>
+              </a:xfrm>
+              <a:prstGeom prst="rect">
+                <a:avLst/>
+              </a:prstGeom>
+              <a:noFill/>
+            </p:spPr>
+            <p:txBody>
+              <a:bodyPr wrap="none" rtlCol="0">
+                <a:spAutoFit/>
+              </a:bodyPr>
+              <a:lstStyle/>
+              <a:p>
+                <a:r>
+                  <a:rPr lang="en-US" dirty="0">
+                    <a:latin typeface="Courier New" panose="02070309020205020404" pitchFamily="49" charset="0"/>
+                    <a:cs typeface="Courier New" panose="02070309020205020404" pitchFamily="49" charset="0"/>
+                  </a:rPr>
+                  <a:t>m(1)(1)</a:t>
+                </a:r>
+              </a:p>
+            </p:txBody>
+          </p:sp>
+          <p:sp>
+            <p:nvSpPr>
+              <p:cNvPr id="53" name="TextBox 52"/>
+              <p:cNvSpPr txBox="1"/>
+              <p:nvPr/>
+            </p:nvSpPr>
+            <p:spPr>
+              <a:xfrm>
+                <a:off x="3762633" y="3099730"/>
+                <a:ext cx="1149674" cy="369332"/>
+              </a:xfrm>
+              <a:prstGeom prst="rect">
+                <a:avLst/>
+              </a:prstGeom>
+              <a:noFill/>
+            </p:spPr>
+            <p:txBody>
+              <a:bodyPr wrap="none" rtlCol="0">
+                <a:spAutoFit/>
+              </a:bodyPr>
+              <a:lstStyle/>
+              <a:p>
+                <a:r>
+                  <a:rPr lang="en-US" dirty="0">
+                    <a:latin typeface="Courier New" panose="02070309020205020404" pitchFamily="49" charset="0"/>
+                    <a:cs typeface="Courier New" panose="02070309020205020404" pitchFamily="49" charset="0"/>
+                  </a:rPr>
+                  <a:t>m(1)(2)</a:t>
+                </a:r>
+              </a:p>
+            </p:txBody>
+          </p:sp>
+          <p:sp>
+            <p:nvSpPr>
+              <p:cNvPr id="54" name="TextBox 53"/>
+              <p:cNvSpPr txBox="1"/>
+              <p:nvPr/>
+            </p:nvSpPr>
+            <p:spPr>
+              <a:xfrm>
+                <a:off x="3762633" y="3960859"/>
+                <a:ext cx="1149674" cy="369332"/>
+              </a:xfrm>
+              <a:prstGeom prst="rect">
+                <a:avLst/>
+              </a:prstGeom>
+              <a:noFill/>
+            </p:spPr>
+            <p:txBody>
+              <a:bodyPr wrap="none" rtlCol="0">
+                <a:spAutoFit/>
+              </a:bodyPr>
+              <a:lstStyle/>
+              <a:p>
+                <a:r>
+                  <a:rPr lang="en-US" dirty="0">
+                    <a:latin typeface="Courier New" panose="02070309020205020404" pitchFamily="49" charset="0"/>
+                    <a:cs typeface="Courier New" panose="02070309020205020404" pitchFamily="49" charset="0"/>
+                  </a:rPr>
+                  <a:t>h(1)(2)</a:t>
+                </a:r>
+              </a:p>
+            </p:txBody>
+          </p:sp>
+          <p:sp>
+            <p:nvSpPr>
+              <p:cNvPr id="55" name="TextBox 54"/>
+              <p:cNvSpPr txBox="1"/>
+              <p:nvPr/>
+            </p:nvSpPr>
+            <p:spPr>
+              <a:xfrm>
+                <a:off x="1692760" y="3889293"/>
+                <a:ext cx="1149674" cy="369332"/>
+              </a:xfrm>
+              <a:prstGeom prst="rect">
+                <a:avLst/>
+              </a:prstGeom>
+              <a:noFill/>
+            </p:spPr>
+            <p:txBody>
+              <a:bodyPr wrap="none" rtlCol="0">
+                <a:spAutoFit/>
+              </a:bodyPr>
+              <a:lstStyle/>
+              <a:p>
+                <a:r>
+                  <a:rPr lang="en-US" dirty="0">
+                    <a:latin typeface="Courier New" panose="02070309020205020404" pitchFamily="49" charset="0"/>
+                    <a:cs typeface="Courier New" panose="02070309020205020404" pitchFamily="49" charset="0"/>
+                  </a:rPr>
+                  <a:t>h(1)(1)</a:t>
+                </a:r>
+              </a:p>
+            </p:txBody>
+          </p:sp>
+          <p:sp>
+            <p:nvSpPr>
+              <p:cNvPr id="74" name="TextBox 73"/>
+              <p:cNvSpPr txBox="1"/>
+              <p:nvPr/>
+            </p:nvSpPr>
+            <p:spPr>
+              <a:xfrm>
+                <a:off x="2177020" y="2664981"/>
+                <a:ext cx="1149674" cy="369332"/>
+              </a:xfrm>
+              <a:prstGeom prst="rect">
+                <a:avLst/>
+              </a:prstGeom>
+              <a:noFill/>
+            </p:spPr>
+            <p:txBody>
+              <a:bodyPr wrap="none" rtlCol="0">
+                <a:spAutoFit/>
+              </a:bodyPr>
+              <a:lstStyle/>
+              <a:p>
+                <a:r>
+                  <a:rPr lang="en-US" dirty="0">
+                    <a:latin typeface="Courier New" panose="02070309020205020404" pitchFamily="49" charset="0"/>
+                    <a:cs typeface="Courier New" panose="02070309020205020404" pitchFamily="49" charset="0"/>
+                  </a:rPr>
+                  <a:t>h(1)(2)</a:t>
+                </a:r>
+              </a:p>
+            </p:txBody>
+          </p:sp>
+          <p:sp>
+            <p:nvSpPr>
+              <p:cNvPr id="75" name="TextBox 74"/>
+              <p:cNvSpPr txBox="1"/>
+              <p:nvPr/>
+            </p:nvSpPr>
+            <p:spPr>
+              <a:xfrm>
+                <a:off x="147579" y="2680919"/>
+                <a:ext cx="1149674" cy="369332"/>
+              </a:xfrm>
+              <a:prstGeom prst="rect">
+                <a:avLst/>
+              </a:prstGeom>
+              <a:noFill/>
+            </p:spPr>
+            <p:txBody>
+              <a:bodyPr wrap="none" rtlCol="0">
+                <a:spAutoFit/>
+              </a:bodyPr>
+              <a:lstStyle/>
+              <a:p>
+                <a:r>
+                  <a:rPr lang="en-US" dirty="0">
+                    <a:latin typeface="Courier New" panose="02070309020205020404" pitchFamily="49" charset="0"/>
+                    <a:cs typeface="Courier New" panose="02070309020205020404" pitchFamily="49" charset="0"/>
+                  </a:rPr>
+                  <a:t>h(1)(1)</a:t>
+                </a:r>
+              </a:p>
+            </p:txBody>
+          </p:sp>
+          <p:sp>
+            <p:nvSpPr>
+              <p:cNvPr id="76" name="TextBox 75"/>
+              <p:cNvSpPr txBox="1"/>
+              <p:nvPr/>
+            </p:nvSpPr>
+            <p:spPr>
+              <a:xfrm>
+                <a:off x="4206461" y="2654866"/>
+                <a:ext cx="1149674" cy="369332"/>
+              </a:xfrm>
+              <a:prstGeom prst="rect">
+                <a:avLst/>
+              </a:prstGeom>
+              <a:noFill/>
+            </p:spPr>
+            <p:txBody>
+              <a:bodyPr wrap="none" rtlCol="0">
+                <a:spAutoFit/>
+              </a:bodyPr>
+              <a:lstStyle/>
+              <a:p>
+                <a:r>
+                  <a:rPr lang="en-US" dirty="0">
+                    <a:latin typeface="Courier New" panose="02070309020205020404" pitchFamily="49" charset="0"/>
+                    <a:cs typeface="Courier New" panose="02070309020205020404" pitchFamily="49" charset="0"/>
+                  </a:rPr>
+                  <a:t>h(1)(3)</a:t>
+                </a:r>
+              </a:p>
+            </p:txBody>
+          </p:sp>
+          <p:sp>
+            <p:nvSpPr>
+              <p:cNvPr id="77" name="TextBox 76"/>
+              <p:cNvSpPr txBox="1"/>
+              <p:nvPr/>
+            </p:nvSpPr>
+            <p:spPr>
+              <a:xfrm>
+                <a:off x="6235902" y="2680919"/>
+                <a:ext cx="1149674" cy="369332"/>
+              </a:xfrm>
+              <a:prstGeom prst="rect">
+                <a:avLst/>
+              </a:prstGeom>
+              <a:noFill/>
+            </p:spPr>
+            <p:txBody>
+              <a:bodyPr wrap="none" rtlCol="0">
+                <a:spAutoFit/>
+              </a:bodyPr>
+              <a:lstStyle/>
+              <a:p>
+                <a:r>
+                  <a:rPr lang="en-US" dirty="0">
+                    <a:latin typeface="Courier New" panose="02070309020205020404" pitchFamily="49" charset="0"/>
+                    <a:cs typeface="Courier New" panose="02070309020205020404" pitchFamily="49" charset="0"/>
+                  </a:rPr>
+                  <a:t>h(1)(t)</a:t>
+                </a:r>
+              </a:p>
+            </p:txBody>
+          </p:sp>
+          <p:sp>
+            <p:nvSpPr>
+              <p:cNvPr id="243" name="TextBox 242"/>
+              <p:cNvSpPr txBox="1"/>
+              <p:nvPr/>
+            </p:nvSpPr>
+            <p:spPr>
+              <a:xfrm>
+                <a:off x="3717112" y="5286533"/>
+                <a:ext cx="2390398" cy="369332"/>
+              </a:xfrm>
+              <a:prstGeom prst="rect">
+                <a:avLst/>
+              </a:prstGeom>
+              <a:noFill/>
+            </p:spPr>
+            <p:txBody>
+              <a:bodyPr wrap="none" rtlCol="0">
+                <a:spAutoFit/>
+              </a:bodyPr>
+              <a:lstStyle/>
+              <a:p>
+                <a:pPr algn="ctr"/>
+                <a:r>
+                  <a:rPr lang="en-US" b="1" dirty="0">
+                    <a:latin typeface="Courier New" panose="02070309020205020404" pitchFamily="49" charset="0"/>
+                    <a:cs typeface="Courier New" panose="02070309020205020404" pitchFamily="49" charset="0"/>
+                  </a:rPr>
+                  <a:t>KELOMPOK FITUR 1</a:t>
+                </a:r>
+              </a:p>
+            </p:txBody>
+          </p:sp>
+        </p:grpSp>
+        <p:cxnSp>
+          <p:nvCxnSpPr>
+            <p:cNvPr id="183" name="Connector: Elbow 182"/>
+            <p:cNvCxnSpPr>
+              <a:stCxn id="60" idx="0"/>
+              <a:endCxn id="81" idx="2"/>
+            </p:cNvCxnSpPr>
+            <p:nvPr/>
+          </p:nvCxnSpPr>
+          <p:spPr>
+            <a:xfrm rot="5400000" flipH="1" flipV="1">
+              <a:off x="15582699" y="2188635"/>
+              <a:ext cx="2388065" cy="4655893"/>
+            </a:xfrm>
+            <a:prstGeom prst="bentConnector3">
+              <a:avLst>
+                <a:gd name="adj1" fmla="val 65316"/>
+              </a:avLst>
+            </a:prstGeom>
+            <a:ln w="28575">
+              <a:tailEnd type="triangle"/>
+            </a:ln>
+          </p:spPr>
+          <p:style>
+            <a:lnRef idx="1">
+              <a:schemeClr val="accent1"/>
+            </a:lnRef>
+            <a:fillRef idx="0">
+              <a:schemeClr val="accent1"/>
+            </a:fillRef>
+            <a:effectRef idx="0">
+              <a:schemeClr val="accent1"/>
+            </a:effectRef>
+            <a:fontRef idx="minor">
+              <a:schemeClr val="tx1"/>
+            </a:fontRef>
+          </p:style>
+        </p:cxnSp>
+        <p:cxnSp>
+          <p:nvCxnSpPr>
+            <p:cNvPr id="185" name="Connector: Elbow 184"/>
+            <p:cNvCxnSpPr>
+              <a:stCxn id="59" idx="0"/>
+              <a:endCxn id="80" idx="2"/>
+            </p:cNvCxnSpPr>
+            <p:nvPr/>
+          </p:nvCxnSpPr>
+          <p:spPr>
+            <a:xfrm rot="5400000" flipH="1" flipV="1">
+              <a:off x="13549792" y="2188635"/>
+              <a:ext cx="2388065" cy="4655893"/>
+            </a:xfrm>
+            <a:prstGeom prst="bentConnector3">
+              <a:avLst>
+                <a:gd name="adj1" fmla="val 72123"/>
+              </a:avLst>
+            </a:prstGeom>
+            <a:ln w="28575">
+              <a:tailEnd type="triangle"/>
+            </a:ln>
+          </p:spPr>
+          <p:style>
+            <a:lnRef idx="1">
+              <a:schemeClr val="accent1"/>
+            </a:lnRef>
+            <a:fillRef idx="0">
+              <a:schemeClr val="accent1"/>
+            </a:fillRef>
+            <a:effectRef idx="0">
+              <a:schemeClr val="accent1"/>
+            </a:effectRef>
+            <a:fontRef idx="minor">
+              <a:schemeClr val="tx1"/>
+            </a:fontRef>
+          </p:style>
+        </p:cxnSp>
+        <p:cxnSp>
+          <p:nvCxnSpPr>
+            <p:cNvPr id="188" name="Connector: Elbow 187"/>
+            <p:cNvCxnSpPr>
+              <a:stCxn id="58" idx="0"/>
+              <a:endCxn id="79" idx="2"/>
+            </p:cNvCxnSpPr>
+            <p:nvPr/>
+          </p:nvCxnSpPr>
+          <p:spPr>
+            <a:xfrm rot="5400000" flipH="1" flipV="1">
+              <a:off x="11516885" y="2188635"/>
+              <a:ext cx="2388065" cy="4655893"/>
+            </a:xfrm>
+            <a:prstGeom prst="bentConnector3">
+              <a:avLst>
+                <a:gd name="adj1" fmla="val 79781"/>
+              </a:avLst>
+            </a:prstGeom>
+            <a:ln w="28575">
+              <a:tailEnd type="triangle"/>
+            </a:ln>
+          </p:spPr>
+          <p:style>
+            <a:lnRef idx="1">
+              <a:schemeClr val="accent1"/>
+            </a:lnRef>
+            <a:fillRef idx="0">
+              <a:schemeClr val="accent1"/>
+            </a:fillRef>
+            <a:effectRef idx="0">
+              <a:schemeClr val="accent1"/>
+            </a:effectRef>
+            <a:fontRef idx="minor">
+              <a:schemeClr val="tx1"/>
+            </a:fontRef>
+          </p:style>
+        </p:cxnSp>
+        <p:cxnSp>
+          <p:nvCxnSpPr>
+            <p:cNvPr id="191" name="Connector: Elbow 190"/>
+            <p:cNvCxnSpPr>
+              <a:stCxn id="57" idx="0"/>
+              <a:endCxn id="78" idx="2"/>
+            </p:cNvCxnSpPr>
+            <p:nvPr/>
+          </p:nvCxnSpPr>
+          <p:spPr>
+            <a:xfrm rot="5400000" flipH="1" flipV="1">
+              <a:off x="9471277" y="2219891"/>
+              <a:ext cx="2388065" cy="4655893"/>
+            </a:xfrm>
+            <a:prstGeom prst="bentConnector3">
+              <a:avLst>
+                <a:gd name="adj1" fmla="val 88290"/>
+              </a:avLst>
+            </a:prstGeom>
+            <a:ln w="28575">
+              <a:tailEnd type="triangle"/>
+            </a:ln>
+          </p:spPr>
+          <p:style>
+            <a:lnRef idx="1">
+              <a:schemeClr val="accent1"/>
+            </a:lnRef>
+            <a:fillRef idx="0">
+              <a:schemeClr val="accent1"/>
+            </a:fillRef>
+            <a:effectRef idx="0">
+              <a:schemeClr val="accent1"/>
+            </a:effectRef>
+            <a:fontRef idx="minor">
+              <a:schemeClr val="tx1"/>
+            </a:fontRef>
+          </p:style>
+        </p:cxnSp>
+        <p:cxnSp>
+          <p:nvCxnSpPr>
+            <p:cNvPr id="210" name="Connector: Elbow 209"/>
+            <p:cNvCxnSpPr>
+              <a:stCxn id="131" idx="0"/>
+              <a:endCxn id="78" idx="2"/>
+            </p:cNvCxnSpPr>
+            <p:nvPr/>
+          </p:nvCxnSpPr>
+          <p:spPr>
+            <a:xfrm rot="16200000" flipV="1">
+              <a:off x="14472676" y="1874385"/>
+              <a:ext cx="2282137" cy="5240975"/>
+            </a:xfrm>
+            <a:prstGeom prst="bentConnector3">
+              <a:avLst>
+                <a:gd name="adj1" fmla="val 34863"/>
+              </a:avLst>
+            </a:prstGeom>
+            <a:ln>
+              <a:solidFill>
+                <a:srgbClr val="FF0000"/>
+              </a:solidFill>
+              <a:tailEnd type="triangle"/>
+            </a:ln>
+          </p:spPr>
+          <p:style>
+            <a:lnRef idx="3">
+              <a:schemeClr val="accent2"/>
+            </a:lnRef>
+            <a:fillRef idx="0">
+              <a:schemeClr val="accent2"/>
+            </a:fillRef>
+            <a:effectRef idx="2">
+              <a:schemeClr val="accent2"/>
+            </a:effectRef>
+            <a:fontRef idx="minor">
+              <a:schemeClr val="tx1"/>
+            </a:fontRef>
+          </p:style>
+        </p:cxnSp>
+        <p:cxnSp>
+          <p:nvCxnSpPr>
+            <p:cNvPr id="217" name="Connector: Elbow 216"/>
+            <p:cNvCxnSpPr>
+              <a:stCxn id="132" idx="0"/>
+              <a:endCxn id="79" idx="2"/>
+            </p:cNvCxnSpPr>
+            <p:nvPr/>
+          </p:nvCxnSpPr>
+          <p:spPr>
+            <a:xfrm rot="16200000" flipV="1">
+              <a:off x="16518284" y="1843129"/>
+              <a:ext cx="2282137" cy="5240975"/>
+            </a:xfrm>
+            <a:prstGeom prst="bentConnector3">
+              <a:avLst>
+                <a:gd name="adj1" fmla="val 42877"/>
+              </a:avLst>
+            </a:prstGeom>
+            <a:ln>
+              <a:solidFill>
+                <a:srgbClr val="FF0000"/>
+              </a:solidFill>
+              <a:tailEnd type="triangle"/>
+            </a:ln>
+          </p:spPr>
+          <p:style>
+            <a:lnRef idx="3">
+              <a:schemeClr val="accent2"/>
+            </a:lnRef>
+            <a:fillRef idx="0">
+              <a:schemeClr val="accent2"/>
+            </a:fillRef>
+            <a:effectRef idx="2">
+              <a:schemeClr val="accent2"/>
+            </a:effectRef>
+            <a:fontRef idx="minor">
+              <a:schemeClr val="tx1"/>
+            </a:fontRef>
+          </p:style>
+        </p:cxnSp>
+        <p:cxnSp>
+          <p:nvCxnSpPr>
+            <p:cNvPr id="223" name="Connector: Elbow 222"/>
+            <p:cNvCxnSpPr>
+              <a:stCxn id="133" idx="0"/>
+              <a:endCxn id="80" idx="2"/>
+            </p:cNvCxnSpPr>
+            <p:nvPr/>
+          </p:nvCxnSpPr>
+          <p:spPr>
+            <a:xfrm rot="16200000" flipV="1">
+              <a:off x="18551191" y="1843129"/>
+              <a:ext cx="2282137" cy="5240975"/>
+            </a:xfrm>
+            <a:prstGeom prst="bentConnector3">
+              <a:avLst>
+                <a:gd name="adj1" fmla="val 50001"/>
+              </a:avLst>
+            </a:prstGeom>
+            <a:ln>
+              <a:solidFill>
+                <a:srgbClr val="FF0000"/>
+              </a:solidFill>
+              <a:tailEnd type="triangle"/>
+            </a:ln>
+          </p:spPr>
+          <p:style>
+            <a:lnRef idx="3">
+              <a:schemeClr val="accent2"/>
+            </a:lnRef>
+            <a:fillRef idx="0">
+              <a:schemeClr val="accent2"/>
+            </a:fillRef>
+            <a:effectRef idx="2">
+              <a:schemeClr val="accent2"/>
+            </a:effectRef>
+            <a:fontRef idx="minor">
+              <a:schemeClr val="tx1"/>
+            </a:fontRef>
+          </p:style>
+        </p:cxnSp>
+        <p:cxnSp>
+          <p:nvCxnSpPr>
+            <p:cNvPr id="229" name="Connector: Elbow 228"/>
+            <p:cNvCxnSpPr>
+              <a:cxnSpLocks/>
+              <a:stCxn id="134" idx="0"/>
+              <a:endCxn id="81" idx="2"/>
+            </p:cNvCxnSpPr>
+            <p:nvPr/>
+          </p:nvCxnSpPr>
+          <p:spPr>
+            <a:xfrm rot="16200000" flipV="1">
+              <a:off x="20584098" y="1843129"/>
+              <a:ext cx="2282137" cy="5240975"/>
+            </a:xfrm>
+            <a:prstGeom prst="bentConnector3">
+              <a:avLst>
+                <a:gd name="adj1" fmla="val 56233"/>
+              </a:avLst>
+            </a:prstGeom>
+            <a:ln>
+              <a:solidFill>
+                <a:srgbClr val="FF0000"/>
+              </a:solidFill>
+              <a:tailEnd type="triangle"/>
+            </a:ln>
+          </p:spPr>
+          <p:style>
+            <a:lnRef idx="3">
+              <a:schemeClr val="accent2"/>
+            </a:lnRef>
+            <a:fillRef idx="0">
+              <a:schemeClr val="accent2"/>
+            </a:fillRef>
+            <a:effectRef idx="2">
+              <a:schemeClr val="accent2"/>
+            </a:effectRef>
+            <a:fontRef idx="minor">
+              <a:schemeClr val="tx1"/>
+            </a:fontRef>
+          </p:style>
+        </p:cxnSp>
+        <p:grpSp>
+          <p:nvGrpSpPr>
+            <p:cNvPr id="2" name="Group 1"/>
+            <p:cNvGrpSpPr/>
+            <p:nvPr/>
+          </p:nvGrpSpPr>
+          <p:grpSpPr>
+            <a:xfrm>
+              <a:off x="17166402" y="4975155"/>
+              <a:ext cx="7754087" cy="3071847"/>
+              <a:chOff x="17166402" y="4975155"/>
+              <a:chExt cx="7754087" cy="3071847"/>
+            </a:xfrm>
+          </p:grpSpPr>
+          <p:grpSp>
+            <p:nvGrpSpPr>
+              <p:cNvPr id="116" name="Group 115"/>
+              <p:cNvGrpSpPr/>
+              <p:nvPr/>
+            </p:nvGrpSpPr>
+            <p:grpSpPr>
+              <a:xfrm>
+                <a:off x="17166402" y="4975155"/>
+                <a:ext cx="7754087" cy="2589232"/>
+                <a:chOff x="147579" y="2654866"/>
+                <a:chExt cx="7754087" cy="2589232"/>
+              </a:xfrm>
+            </p:grpSpPr>
+            <p:grpSp>
+              <p:nvGrpSpPr>
+                <p:cNvPr id="117" name="Group 116"/>
+                <p:cNvGrpSpPr/>
+                <p:nvPr/>
+              </p:nvGrpSpPr>
+              <p:grpSpPr>
+                <a:xfrm>
+                  <a:off x="722416" y="3284396"/>
+                  <a:ext cx="7097405" cy="1488100"/>
+                  <a:chOff x="2309916" y="3258996"/>
+                  <a:chExt cx="7097405" cy="1488100"/>
+                </a:xfrm>
+              </p:grpSpPr>
+              <p:grpSp>
+                <p:nvGrpSpPr>
+                  <p:cNvPr id="130" name="Group 129"/>
+                  <p:cNvGrpSpPr/>
+                  <p:nvPr/>
+                </p:nvGrpSpPr>
+                <p:grpSpPr>
+                  <a:xfrm>
+                    <a:off x="2802908" y="3473076"/>
+                    <a:ext cx="6111422" cy="1274020"/>
+                    <a:chOff x="2024743" y="3813622"/>
+                    <a:chExt cx="6111422" cy="1274020"/>
+                  </a:xfrm>
+                </p:grpSpPr>
+                <p:cxnSp>
+                  <p:nvCxnSpPr>
+                    <p:cNvPr id="136" name="Straight Arrow Connector 135"/>
+                    <p:cNvCxnSpPr>
+                      <a:endCxn id="131" idx="2"/>
+                    </p:cNvCxnSpPr>
+                    <p:nvPr/>
+                  </p:nvCxnSpPr>
+                  <p:spPr>
+                    <a:xfrm flipV="1">
+                      <a:off x="2024743" y="4458112"/>
+                      <a:ext cx="0" cy="629530"/>
+                    </a:xfrm>
+                    <a:prstGeom prst="straightConnector1">
+                      <a:avLst/>
+                    </a:prstGeom>
+                    <a:ln w="28575">
+                      <a:tailEnd type="triangle"/>
+                    </a:ln>
+                  </p:spPr>
+                  <p:style>
+                    <a:lnRef idx="1">
+                      <a:schemeClr val="dk1"/>
+                    </a:lnRef>
+                    <a:fillRef idx="0">
+                      <a:schemeClr val="dk1"/>
+                    </a:fillRef>
+                    <a:effectRef idx="0">
+                      <a:schemeClr val="dk1"/>
+                    </a:effectRef>
+                    <a:fontRef idx="minor">
+                      <a:schemeClr val="tx1"/>
+                    </a:fontRef>
+                  </p:style>
+                </p:cxnSp>
+                <p:cxnSp>
+                  <p:nvCxnSpPr>
+                    <p:cNvPr id="138" name="Straight Arrow Connector 137"/>
+                    <p:cNvCxnSpPr>
+                      <a:endCxn id="132" idx="2"/>
+                    </p:cNvCxnSpPr>
+                    <p:nvPr/>
+                  </p:nvCxnSpPr>
+                  <p:spPr>
+                    <a:xfrm flipV="1">
+                      <a:off x="4070351" y="4426856"/>
+                      <a:ext cx="0" cy="629530"/>
+                    </a:xfrm>
+                    <a:prstGeom prst="straightConnector1">
+                      <a:avLst/>
+                    </a:prstGeom>
+                    <a:ln w="28575">
+                      <a:tailEnd type="triangle"/>
+                    </a:ln>
+                  </p:spPr>
+                  <p:style>
+                    <a:lnRef idx="1">
+                      <a:schemeClr val="dk1"/>
+                    </a:lnRef>
+                    <a:fillRef idx="0">
+                      <a:schemeClr val="dk1"/>
+                    </a:fillRef>
+                    <a:effectRef idx="0">
+                      <a:schemeClr val="dk1"/>
+                    </a:effectRef>
+                    <a:fontRef idx="minor">
+                      <a:schemeClr val="tx1"/>
+                    </a:fontRef>
+                  </p:style>
+                </p:cxnSp>
+                <p:cxnSp>
+                  <p:nvCxnSpPr>
+                    <p:cNvPr id="140" name="Straight Arrow Connector 139"/>
+                    <p:cNvCxnSpPr>
+                      <a:endCxn id="133" idx="2"/>
+                    </p:cNvCxnSpPr>
+                    <p:nvPr/>
+                  </p:nvCxnSpPr>
+                  <p:spPr>
+                    <a:xfrm flipV="1">
+                      <a:off x="6103258" y="4426856"/>
+                      <a:ext cx="0" cy="629530"/>
+                    </a:xfrm>
+                    <a:prstGeom prst="straightConnector1">
+                      <a:avLst/>
+                    </a:prstGeom>
+                    <a:ln w="28575">
+                      <a:tailEnd type="triangle"/>
+                    </a:ln>
+                  </p:spPr>
+                  <p:style>
+                    <a:lnRef idx="1">
+                      <a:schemeClr val="dk1"/>
+                    </a:lnRef>
+                    <a:fillRef idx="0">
+                      <a:schemeClr val="dk1"/>
+                    </a:fillRef>
+                    <a:effectRef idx="0">
+                      <a:schemeClr val="dk1"/>
+                    </a:effectRef>
+                    <a:fontRef idx="minor">
+                      <a:schemeClr val="tx1"/>
+                    </a:fontRef>
+                  </p:style>
+                </p:cxnSp>
+                <p:cxnSp>
+                  <p:nvCxnSpPr>
+                    <p:cNvPr id="142" name="Straight Arrow Connector 141"/>
+                    <p:cNvCxnSpPr>
+                      <a:endCxn id="134" idx="2"/>
+                    </p:cNvCxnSpPr>
+                    <p:nvPr/>
+                  </p:nvCxnSpPr>
+                  <p:spPr>
+                    <a:xfrm flipV="1">
+                      <a:off x="8136165" y="4426856"/>
+                      <a:ext cx="0" cy="629530"/>
+                    </a:xfrm>
+                    <a:prstGeom prst="straightConnector1">
+                      <a:avLst/>
+                    </a:prstGeom>
+                    <a:ln w="28575">
+                      <a:tailEnd type="triangle"/>
+                    </a:ln>
+                  </p:spPr>
+                  <p:style>
+                    <a:lnRef idx="1">
+                      <a:schemeClr val="dk1"/>
+                    </a:lnRef>
+                    <a:fillRef idx="0">
+                      <a:schemeClr val="dk1"/>
+                    </a:fillRef>
+                    <a:effectRef idx="0">
+                      <a:schemeClr val="dk1"/>
+                    </a:effectRef>
+                    <a:fontRef idx="minor">
+                      <a:schemeClr val="tx1"/>
+                    </a:fontRef>
+                  </p:style>
+                </p:cxnSp>
+                <p:cxnSp>
+                  <p:nvCxnSpPr>
+                    <p:cNvPr id="143" name="Straight Arrow Connector 142"/>
+                    <p:cNvCxnSpPr/>
+                    <p:nvPr/>
+                  </p:nvCxnSpPr>
+                  <p:spPr>
+                    <a:xfrm>
+                      <a:off x="2517734" y="3844161"/>
+                      <a:ext cx="1059625" cy="0"/>
+                    </a:xfrm>
+                    <a:prstGeom prst="straightConnector1">
+                      <a:avLst/>
+                    </a:prstGeom>
+                    <a:ln w="28575">
+                      <a:tailEnd type="triangle"/>
+                    </a:ln>
+                  </p:spPr>
+                  <p:style>
+                    <a:lnRef idx="1">
+                      <a:schemeClr val="dk1"/>
+                    </a:lnRef>
+                    <a:fillRef idx="0">
+                      <a:schemeClr val="dk1"/>
+                    </a:fillRef>
+                    <a:effectRef idx="0">
+                      <a:schemeClr val="dk1"/>
+                    </a:effectRef>
+                    <a:fontRef idx="minor">
+                      <a:schemeClr val="tx1"/>
+                    </a:fontRef>
+                  </p:style>
+                </p:cxnSp>
+                <p:cxnSp>
+                  <p:nvCxnSpPr>
+                    <p:cNvPr id="144" name="Straight Arrow Connector 143"/>
+                    <p:cNvCxnSpPr/>
+                    <p:nvPr/>
+                  </p:nvCxnSpPr>
+                  <p:spPr>
+                    <a:xfrm>
+                      <a:off x="4563342" y="3844161"/>
+                      <a:ext cx="1059625" cy="0"/>
+                    </a:xfrm>
+                    <a:prstGeom prst="straightConnector1">
+                      <a:avLst/>
+                    </a:prstGeom>
+                    <a:ln w="28575">
+                      <a:tailEnd type="triangle"/>
+                    </a:ln>
+                  </p:spPr>
+                  <p:style>
+                    <a:lnRef idx="1">
+                      <a:schemeClr val="dk1"/>
+                    </a:lnRef>
+                    <a:fillRef idx="0">
+                      <a:schemeClr val="dk1"/>
+                    </a:fillRef>
+                    <a:effectRef idx="0">
+                      <a:schemeClr val="dk1"/>
+                    </a:effectRef>
+                    <a:fontRef idx="minor">
+                      <a:schemeClr val="tx1"/>
+                    </a:fontRef>
+                  </p:style>
+                </p:cxnSp>
+                <p:sp>
+                  <p:nvSpPr>
+                    <p:cNvPr id="145" name="TextBox 144"/>
+                    <p:cNvSpPr txBox="1"/>
+                    <p:nvPr/>
+                  </p:nvSpPr>
+                  <p:spPr>
+                    <a:xfrm>
+                      <a:off x="6583549" y="3813622"/>
+                      <a:ext cx="1078674" cy="461665"/>
+                    </a:xfrm>
+                    <a:prstGeom prst="rect">
+                      <a:avLst/>
+                    </a:prstGeom>
+                    <a:noFill/>
+                  </p:spPr>
+                  <p:txBody>
+                    <a:bodyPr wrap="square" rtlCol="0">
+                      <a:spAutoFit/>
+                    </a:bodyPr>
+                    <a:lstStyle/>
+                    <a:p>
+                      <a:pPr algn="ctr"/>
+                      <a:r>
+                        <a:rPr lang="en-US" sz="2400" dirty="0">
+                          <a:latin typeface="Courier New" panose="02070309020205020404" pitchFamily="49" charset="0"/>
+                          <a:cs typeface="Courier New" panose="02070309020205020404" pitchFamily="49" charset="0"/>
+                        </a:rPr>
+                        <a:t>…………</a:t>
+                      </a:r>
+                    </a:p>
+                  </p:txBody>
+                </p:sp>
+                <p:cxnSp>
+                  <p:nvCxnSpPr>
+                    <p:cNvPr id="146" name="Straight Arrow Connector 145"/>
+                    <p:cNvCxnSpPr/>
+                    <p:nvPr/>
+                  </p:nvCxnSpPr>
+                  <p:spPr>
+                    <a:xfrm flipV="1">
+                      <a:off x="2517734" y="4195385"/>
+                      <a:ext cx="1059625" cy="18108"/>
+                    </a:xfrm>
+                    <a:prstGeom prst="straightConnector1">
+                      <a:avLst/>
+                    </a:prstGeom>
+                    <a:ln w="28575">
+                      <a:tailEnd type="triangle"/>
+                    </a:ln>
+                  </p:spPr>
+                  <p:style>
+                    <a:lnRef idx="1">
+                      <a:schemeClr val="dk1"/>
+                    </a:lnRef>
+                    <a:fillRef idx="0">
+                      <a:schemeClr val="dk1"/>
+                    </a:fillRef>
+                    <a:effectRef idx="0">
+                      <a:schemeClr val="dk1"/>
+                    </a:effectRef>
+                    <a:fontRef idx="minor">
+                      <a:schemeClr val="tx1"/>
+                    </a:fontRef>
+                  </p:style>
+                </p:cxnSp>
+                <p:cxnSp>
+                  <p:nvCxnSpPr>
+                    <p:cNvPr id="147" name="Straight Arrow Connector 146"/>
+                    <p:cNvCxnSpPr/>
+                    <p:nvPr/>
+                  </p:nvCxnSpPr>
+                  <p:spPr>
+                    <a:xfrm>
+                      <a:off x="4563342" y="4244749"/>
+                      <a:ext cx="1059625" cy="0"/>
+                    </a:xfrm>
+                    <a:prstGeom prst="straightConnector1">
+                      <a:avLst/>
+                    </a:prstGeom>
+                    <a:ln w="28575">
+                      <a:tailEnd type="triangle"/>
+                    </a:ln>
+                  </p:spPr>
+                  <p:style>
+                    <a:lnRef idx="1">
+                      <a:schemeClr val="dk1"/>
+                    </a:lnRef>
+                    <a:fillRef idx="0">
+                      <a:schemeClr val="dk1"/>
+                    </a:fillRef>
+                    <a:effectRef idx="0">
+                      <a:schemeClr val="dk1"/>
+                    </a:effectRef>
+                    <a:fontRef idx="minor">
+                      <a:schemeClr val="tx1"/>
+                    </a:fontRef>
+                  </p:style>
+                </p:cxnSp>
+              </p:grpSp>
+              <p:sp>
+                <p:nvSpPr>
+                  <p:cNvPr id="131" name="Rectangle 130"/>
+                  <p:cNvSpPr/>
+                  <p:nvPr/>
+                </p:nvSpPr>
+                <p:spPr>
+                  <a:xfrm>
+                    <a:off x="2309916" y="3290252"/>
+                    <a:ext cx="985983" cy="827314"/>
+                  </a:xfrm>
+                  <a:prstGeom prst="rect">
+                    <a:avLst/>
+                  </a:prstGeom>
+                  <a:pattFill prst="dkUpDiag">
+                    <a:fgClr>
+                      <a:schemeClr val="accent3"/>
+                    </a:fgClr>
+                    <a:bgClr>
+                      <a:schemeClr val="bg1"/>
+                    </a:bgClr>
+                  </a:pattFill>
+                </p:spPr>
+                <p:style>
+                  <a:lnRef idx="2">
+                    <a:schemeClr val="accent3">
+                      <a:shade val="50000"/>
+                    </a:schemeClr>
+                  </a:lnRef>
+                  <a:fillRef idx="1">
+                    <a:schemeClr val="accent3"/>
+                  </a:fillRef>
+                  <a:effectRef idx="0">
+                    <a:schemeClr val="accent3"/>
+                  </a:effectRef>
+                  <a:fontRef idx="minor">
+                    <a:schemeClr val="lt1"/>
+                  </a:fontRef>
+                </p:style>
+                <p:txBody>
+                  <a:bodyPr rot="0" spcFirstLastPara="0" vertOverflow="overflow" horzOverflow="overflow" vert="horz" wrap="square" lIns="91440" tIns="45720" rIns="91440" bIns="45720" numCol="1" spcCol="0" rtlCol="0" fromWordArt="0" anchor="ctr" anchorCtr="0" forceAA="0" compatLnSpc="1">
+                    <a:prstTxWarp prst="textNoShape">
+                      <a:avLst/>
+                    </a:prstTxWarp>
+                    <a:noAutofit/>
+                  </a:bodyPr>
+                  <a:lstStyle/>
+                  <a:p>
+                    <a:pPr algn="ctr"/>
+                    <a:endParaRPr lang="en-US" dirty="0"/>
+                  </a:p>
+                </p:txBody>
+              </p:sp>
+              <p:sp>
+                <p:nvSpPr>
+                  <p:cNvPr id="132" name="Rectangle 131"/>
+                  <p:cNvSpPr/>
+                  <p:nvPr/>
+                </p:nvSpPr>
+                <p:spPr>
+                  <a:xfrm>
+                    <a:off x="4355524" y="3258996"/>
+                    <a:ext cx="985983" cy="827314"/>
+                  </a:xfrm>
+                  <a:prstGeom prst="rect">
+                    <a:avLst/>
+                  </a:prstGeom>
+                  <a:pattFill prst="dkUpDiag">
+                    <a:fgClr>
+                      <a:schemeClr val="accent3"/>
+                    </a:fgClr>
+                    <a:bgClr>
+                      <a:schemeClr val="bg1"/>
+                    </a:bgClr>
+                  </a:pattFill>
+                </p:spPr>
+                <p:style>
+                  <a:lnRef idx="2">
+                    <a:schemeClr val="accent3">
+                      <a:shade val="50000"/>
+                    </a:schemeClr>
+                  </a:lnRef>
+                  <a:fillRef idx="1">
+                    <a:schemeClr val="accent3"/>
+                  </a:fillRef>
+                  <a:effectRef idx="0">
+                    <a:schemeClr val="accent3"/>
+                  </a:effectRef>
+                  <a:fontRef idx="minor">
+                    <a:schemeClr val="lt1"/>
+                  </a:fontRef>
+                </p:style>
+                <p:txBody>
+                  <a:bodyPr rot="0" spcFirstLastPara="0" vertOverflow="overflow" horzOverflow="overflow" vert="horz" wrap="square" lIns="91440" tIns="45720" rIns="91440" bIns="45720" numCol="1" spcCol="0" rtlCol="0" fromWordArt="0" anchor="ctr" anchorCtr="0" forceAA="0" compatLnSpc="1">
+                    <a:prstTxWarp prst="textNoShape">
+                      <a:avLst/>
+                    </a:prstTxWarp>
+                    <a:noAutofit/>
+                  </a:bodyPr>
+                  <a:lstStyle/>
+                  <a:p>
+                    <a:pPr algn="ctr"/>
+                    <a:endParaRPr lang="en-US"/>
+                  </a:p>
+                </p:txBody>
+              </p:sp>
+              <p:sp>
+                <p:nvSpPr>
+                  <p:cNvPr id="133" name="Rectangle 132"/>
+                  <p:cNvSpPr/>
+                  <p:nvPr/>
+                </p:nvSpPr>
+                <p:spPr>
+                  <a:xfrm>
+                    <a:off x="6388431" y="3258996"/>
+                    <a:ext cx="985983" cy="827314"/>
+                  </a:xfrm>
+                  <a:prstGeom prst="rect">
+                    <a:avLst/>
+                  </a:prstGeom>
+                  <a:pattFill prst="dkUpDiag">
+                    <a:fgClr>
+                      <a:schemeClr val="accent3"/>
+                    </a:fgClr>
+                    <a:bgClr>
+                      <a:schemeClr val="bg1"/>
+                    </a:bgClr>
+                  </a:pattFill>
+                </p:spPr>
+                <p:style>
+                  <a:lnRef idx="2">
+                    <a:schemeClr val="accent3">
+                      <a:shade val="50000"/>
+                    </a:schemeClr>
+                  </a:lnRef>
+                  <a:fillRef idx="1">
+                    <a:schemeClr val="accent3"/>
+                  </a:fillRef>
+                  <a:effectRef idx="0">
+                    <a:schemeClr val="accent3"/>
+                  </a:effectRef>
+                  <a:fontRef idx="minor">
+                    <a:schemeClr val="lt1"/>
+                  </a:fontRef>
+                </p:style>
+                <p:txBody>
+                  <a:bodyPr rot="0" spcFirstLastPara="0" vertOverflow="overflow" horzOverflow="overflow" vert="horz" wrap="square" lIns="91440" tIns="45720" rIns="91440" bIns="45720" numCol="1" spcCol="0" rtlCol="0" fromWordArt="0" anchor="ctr" anchorCtr="0" forceAA="0" compatLnSpc="1">
+                    <a:prstTxWarp prst="textNoShape">
+                      <a:avLst/>
+                    </a:prstTxWarp>
+                    <a:noAutofit/>
+                  </a:bodyPr>
+                  <a:lstStyle/>
+                  <a:p>
+                    <a:pPr algn="ctr"/>
+                    <a:endParaRPr lang="en-US"/>
+                  </a:p>
+                </p:txBody>
+              </p:sp>
+              <p:sp>
+                <p:nvSpPr>
+                  <p:cNvPr id="134" name="Rectangle 133"/>
+                  <p:cNvSpPr/>
+                  <p:nvPr/>
+                </p:nvSpPr>
+                <p:spPr>
+                  <a:xfrm>
+                    <a:off x="8421338" y="3258996"/>
+                    <a:ext cx="985983" cy="827314"/>
+                  </a:xfrm>
+                  <a:prstGeom prst="rect">
+                    <a:avLst/>
+                  </a:prstGeom>
+                  <a:pattFill prst="dkUpDiag">
+                    <a:fgClr>
+                      <a:schemeClr val="accent3"/>
+                    </a:fgClr>
+                    <a:bgClr>
+                      <a:schemeClr val="bg1"/>
+                    </a:bgClr>
+                  </a:pattFill>
+                </p:spPr>
+                <p:style>
+                  <a:lnRef idx="2">
+                    <a:schemeClr val="accent3">
+                      <a:shade val="50000"/>
+                    </a:schemeClr>
+                  </a:lnRef>
+                  <a:fillRef idx="1">
+                    <a:schemeClr val="accent3"/>
+                  </a:fillRef>
+                  <a:effectRef idx="0">
+                    <a:schemeClr val="accent3"/>
+                  </a:effectRef>
+                  <a:fontRef idx="minor">
+                    <a:schemeClr val="lt1"/>
+                  </a:fontRef>
+                </p:style>
+                <p:txBody>
+                  <a:bodyPr rot="0" spcFirstLastPara="0" vertOverflow="overflow" horzOverflow="overflow" vert="horz" wrap="square" lIns="91440" tIns="45720" rIns="91440" bIns="45720" numCol="1" spcCol="0" rtlCol="0" fromWordArt="0" anchor="ctr" anchorCtr="0" forceAA="0" compatLnSpc="1">
+                    <a:prstTxWarp prst="textNoShape">
+                      <a:avLst/>
+                    </a:prstTxWarp>
+                    <a:noAutofit/>
+                  </a:bodyPr>
+                  <a:lstStyle/>
+                  <a:p>
+                    <a:pPr algn="ctr"/>
+                    <a:endParaRPr lang="en-US"/>
+                  </a:p>
+                </p:txBody>
+              </p:sp>
+            </p:grpSp>
+            <p:sp>
+              <p:nvSpPr>
+                <p:cNvPr id="118" name="TextBox 117"/>
+                <p:cNvSpPr txBox="1"/>
+                <p:nvPr/>
+              </p:nvSpPr>
+              <p:spPr>
+                <a:xfrm>
+                  <a:off x="6751992" y="4874766"/>
+                  <a:ext cx="1149674" cy="369332"/>
+                </a:xfrm>
+                <a:prstGeom prst="rect">
+                  <a:avLst/>
+                </a:prstGeom>
+                <a:noFill/>
+              </p:spPr>
+              <p:txBody>
+                <a:bodyPr wrap="none" rtlCol="0">
+                  <a:spAutoFit/>
+                </a:bodyPr>
+                <a:lstStyle/>
+                <a:p>
+                  <a:pPr algn="ctr"/>
+                  <a:r>
+                    <a:rPr lang="en-US" dirty="0">
+                      <a:latin typeface="Courier New" panose="02070309020205020404" pitchFamily="49" charset="0"/>
+                      <a:cs typeface="Courier New" panose="02070309020205020404" pitchFamily="49" charset="0"/>
+                    </a:rPr>
+                    <a:t>x(k)(t)</a:t>
+                  </a:r>
+                </a:p>
+              </p:txBody>
+            </p:sp>
+            <p:sp>
+              <p:nvSpPr>
+                <p:cNvPr id="119" name="TextBox 118"/>
+                <p:cNvSpPr txBox="1"/>
+                <p:nvPr/>
+              </p:nvSpPr>
+              <p:spPr>
+                <a:xfrm>
+                  <a:off x="4844027" y="4874766"/>
+                  <a:ext cx="1149674" cy="369332"/>
+                </a:xfrm>
+                <a:prstGeom prst="rect">
+                  <a:avLst/>
+                </a:prstGeom>
+                <a:noFill/>
+              </p:spPr>
+              <p:txBody>
+                <a:bodyPr wrap="none" rtlCol="0">
+                  <a:spAutoFit/>
+                </a:bodyPr>
+                <a:lstStyle/>
+                <a:p>
+                  <a:pPr algn="ctr"/>
+                  <a:r>
+                    <a:rPr lang="en-US" dirty="0">
+                      <a:latin typeface="Courier New" panose="02070309020205020404" pitchFamily="49" charset="0"/>
+                      <a:cs typeface="Courier New" panose="02070309020205020404" pitchFamily="49" charset="0"/>
+                    </a:rPr>
+                    <a:t>x(k)(3)</a:t>
+                  </a:r>
+                </a:p>
+              </p:txBody>
+            </p:sp>
+            <p:sp>
+              <p:nvSpPr>
+                <p:cNvPr id="120" name="TextBox 119"/>
+                <p:cNvSpPr txBox="1"/>
+                <p:nvPr/>
+              </p:nvSpPr>
+              <p:spPr>
+                <a:xfrm>
+                  <a:off x="2761285" y="4874766"/>
+                  <a:ext cx="1149674" cy="369332"/>
+                </a:xfrm>
+                <a:prstGeom prst="rect">
+                  <a:avLst/>
+                </a:prstGeom>
+                <a:noFill/>
+              </p:spPr>
+              <p:txBody>
+                <a:bodyPr wrap="none" rtlCol="0">
+                  <a:spAutoFit/>
+                </a:bodyPr>
+                <a:lstStyle/>
+                <a:p>
+                  <a:pPr algn="ctr"/>
+                  <a:r>
+                    <a:rPr lang="en-US" dirty="0">
+                      <a:latin typeface="Courier New" panose="02070309020205020404" pitchFamily="49" charset="0"/>
+                      <a:cs typeface="Courier New" panose="02070309020205020404" pitchFamily="49" charset="0"/>
+                    </a:rPr>
+                    <a:t>x(k)(2)</a:t>
+                  </a:r>
+                </a:p>
+              </p:txBody>
+            </p:sp>
+            <p:sp>
+              <p:nvSpPr>
+                <p:cNvPr id="121" name="TextBox 120"/>
+                <p:cNvSpPr txBox="1"/>
+                <p:nvPr/>
+              </p:nvSpPr>
+              <p:spPr>
+                <a:xfrm>
+                  <a:off x="691245" y="4874766"/>
+                  <a:ext cx="1149674" cy="369332"/>
+                </a:xfrm>
+                <a:prstGeom prst="rect">
+                  <a:avLst/>
+                </a:prstGeom>
+                <a:noFill/>
+              </p:spPr>
+              <p:txBody>
+                <a:bodyPr wrap="none" rtlCol="0">
+                  <a:spAutoFit/>
+                </a:bodyPr>
+                <a:lstStyle/>
+                <a:p>
+                  <a:pPr algn="ctr"/>
+                  <a:r>
+                    <a:rPr lang="en-US" dirty="0">
+                      <a:latin typeface="Courier New" panose="02070309020205020404" pitchFamily="49" charset="0"/>
+                      <a:cs typeface="Courier New" panose="02070309020205020404" pitchFamily="49" charset="0"/>
+                    </a:rPr>
+                    <a:t>x(k)(1)</a:t>
+                  </a:r>
+                </a:p>
+              </p:txBody>
+            </p:sp>
+            <p:sp>
+              <p:nvSpPr>
+                <p:cNvPr id="122" name="TextBox 121"/>
+                <p:cNvSpPr txBox="1"/>
+                <p:nvPr/>
+              </p:nvSpPr>
+              <p:spPr>
+                <a:xfrm>
+                  <a:off x="1701152" y="3145007"/>
+                  <a:ext cx="1149674" cy="369332"/>
+                </a:xfrm>
+                <a:prstGeom prst="rect">
+                  <a:avLst/>
+                </a:prstGeom>
+                <a:noFill/>
+              </p:spPr>
+              <p:txBody>
+                <a:bodyPr wrap="none" rtlCol="0">
+                  <a:spAutoFit/>
+                </a:bodyPr>
+                <a:lstStyle/>
+                <a:p>
+                  <a:r>
+                    <a:rPr lang="en-US" dirty="0">
+                      <a:latin typeface="Courier New" panose="02070309020205020404" pitchFamily="49" charset="0"/>
+                      <a:cs typeface="Courier New" panose="02070309020205020404" pitchFamily="49" charset="0"/>
+                    </a:rPr>
+                    <a:t>m(k)(1)</a:t>
+                  </a:r>
+                </a:p>
+              </p:txBody>
+            </p:sp>
+            <p:sp>
+              <p:nvSpPr>
+                <p:cNvPr id="123" name="TextBox 122"/>
+                <p:cNvSpPr txBox="1"/>
+                <p:nvPr/>
+              </p:nvSpPr>
+              <p:spPr>
+                <a:xfrm>
+                  <a:off x="3762633" y="3099730"/>
+                  <a:ext cx="1149674" cy="369332"/>
+                </a:xfrm>
+                <a:prstGeom prst="rect">
+                  <a:avLst/>
+                </a:prstGeom>
+                <a:noFill/>
+              </p:spPr>
+              <p:txBody>
+                <a:bodyPr wrap="none" rtlCol="0">
+                  <a:spAutoFit/>
+                </a:bodyPr>
+                <a:lstStyle/>
+                <a:p>
+                  <a:r>
+                    <a:rPr lang="en-US" dirty="0">
+                      <a:latin typeface="Courier New" panose="02070309020205020404" pitchFamily="49" charset="0"/>
+                      <a:cs typeface="Courier New" panose="02070309020205020404" pitchFamily="49" charset="0"/>
+                    </a:rPr>
+                    <a:t>m(k)(2)</a:t>
+                  </a:r>
+                </a:p>
+              </p:txBody>
+            </p:sp>
+            <p:sp>
+              <p:nvSpPr>
+                <p:cNvPr id="124" name="TextBox 123"/>
+                <p:cNvSpPr txBox="1"/>
+                <p:nvPr/>
+              </p:nvSpPr>
+              <p:spPr>
+                <a:xfrm>
+                  <a:off x="3762633" y="3960859"/>
+                  <a:ext cx="1149674" cy="369332"/>
+                </a:xfrm>
+                <a:prstGeom prst="rect">
+                  <a:avLst/>
+                </a:prstGeom>
+                <a:noFill/>
+              </p:spPr>
+              <p:txBody>
+                <a:bodyPr wrap="none" rtlCol="0">
+                  <a:spAutoFit/>
+                </a:bodyPr>
+                <a:lstStyle/>
+                <a:p>
+                  <a:r>
+                    <a:rPr lang="en-US" dirty="0">
+                      <a:latin typeface="Courier New" panose="02070309020205020404" pitchFamily="49" charset="0"/>
+                      <a:cs typeface="Courier New" panose="02070309020205020404" pitchFamily="49" charset="0"/>
+                    </a:rPr>
+                    <a:t>h(1)(2)</a:t>
+                  </a:r>
+                </a:p>
+              </p:txBody>
+            </p:sp>
+            <p:sp>
+              <p:nvSpPr>
+                <p:cNvPr id="125" name="TextBox 124"/>
+                <p:cNvSpPr txBox="1"/>
+                <p:nvPr/>
+              </p:nvSpPr>
+              <p:spPr>
+                <a:xfrm>
+                  <a:off x="1692760" y="3889293"/>
+                  <a:ext cx="1149674" cy="369332"/>
+                </a:xfrm>
+                <a:prstGeom prst="rect">
+                  <a:avLst/>
+                </a:prstGeom>
+                <a:noFill/>
+              </p:spPr>
+              <p:txBody>
+                <a:bodyPr wrap="none" rtlCol="0">
+                  <a:spAutoFit/>
+                </a:bodyPr>
+                <a:lstStyle/>
+                <a:p>
+                  <a:r>
+                    <a:rPr lang="en-US" dirty="0">
+                      <a:latin typeface="Courier New" panose="02070309020205020404" pitchFamily="49" charset="0"/>
+                      <a:cs typeface="Courier New" panose="02070309020205020404" pitchFamily="49" charset="0"/>
+                    </a:rPr>
+                    <a:t>h(1)(1)</a:t>
+                  </a:r>
+                </a:p>
+              </p:txBody>
+            </p:sp>
+            <p:sp>
+              <p:nvSpPr>
+                <p:cNvPr id="126" name="TextBox 125"/>
+                <p:cNvSpPr txBox="1"/>
+                <p:nvPr/>
+              </p:nvSpPr>
+              <p:spPr>
+                <a:xfrm>
+                  <a:off x="2177020" y="2664981"/>
+                  <a:ext cx="1149674" cy="369332"/>
+                </a:xfrm>
+                <a:prstGeom prst="rect">
+                  <a:avLst/>
+                </a:prstGeom>
+                <a:noFill/>
+              </p:spPr>
+              <p:txBody>
+                <a:bodyPr wrap="none" rtlCol="0">
+                  <a:spAutoFit/>
+                </a:bodyPr>
+                <a:lstStyle/>
+                <a:p>
+                  <a:r>
+                    <a:rPr lang="en-US" dirty="0">
+                      <a:latin typeface="Courier New" panose="02070309020205020404" pitchFamily="49" charset="0"/>
+                      <a:cs typeface="Courier New" panose="02070309020205020404" pitchFamily="49" charset="0"/>
+                    </a:rPr>
+                    <a:t>h(k)(2)</a:t>
+                  </a:r>
+                </a:p>
+              </p:txBody>
+            </p:sp>
+            <p:sp>
+              <p:nvSpPr>
+                <p:cNvPr id="127" name="TextBox 126"/>
+                <p:cNvSpPr txBox="1"/>
+                <p:nvPr/>
+              </p:nvSpPr>
+              <p:spPr>
+                <a:xfrm>
+                  <a:off x="147579" y="2680919"/>
+                  <a:ext cx="1149674" cy="369332"/>
+                </a:xfrm>
+                <a:prstGeom prst="rect">
+                  <a:avLst/>
+                </a:prstGeom>
+                <a:noFill/>
+              </p:spPr>
+              <p:txBody>
+                <a:bodyPr wrap="none" rtlCol="0">
+                  <a:spAutoFit/>
+                </a:bodyPr>
+                <a:lstStyle/>
+                <a:p>
+                  <a:r>
+                    <a:rPr lang="en-US" dirty="0">
+                      <a:latin typeface="Courier New" panose="02070309020205020404" pitchFamily="49" charset="0"/>
+                      <a:cs typeface="Courier New" panose="02070309020205020404" pitchFamily="49" charset="0"/>
+                    </a:rPr>
+                    <a:t>h(k)(1)</a:t>
+                  </a:r>
+                </a:p>
+              </p:txBody>
+            </p:sp>
+            <p:sp>
+              <p:nvSpPr>
+                <p:cNvPr id="128" name="TextBox 127"/>
+                <p:cNvSpPr txBox="1"/>
+                <p:nvPr/>
+              </p:nvSpPr>
+              <p:spPr>
+                <a:xfrm>
+                  <a:off x="4206461" y="2654866"/>
+                  <a:ext cx="1149674" cy="369332"/>
+                </a:xfrm>
+                <a:prstGeom prst="rect">
+                  <a:avLst/>
+                </a:prstGeom>
+                <a:noFill/>
+              </p:spPr>
+              <p:txBody>
+                <a:bodyPr wrap="none" rtlCol="0">
+                  <a:spAutoFit/>
+                </a:bodyPr>
+                <a:lstStyle/>
+                <a:p>
+                  <a:r>
+                    <a:rPr lang="en-US" dirty="0">
+                      <a:latin typeface="Courier New" panose="02070309020205020404" pitchFamily="49" charset="0"/>
+                      <a:cs typeface="Courier New" panose="02070309020205020404" pitchFamily="49" charset="0"/>
+                    </a:rPr>
+                    <a:t>h(k)(3)</a:t>
+                  </a:r>
+                </a:p>
+              </p:txBody>
+            </p:sp>
+            <p:sp>
+              <p:nvSpPr>
+                <p:cNvPr id="129" name="TextBox 128"/>
+                <p:cNvSpPr txBox="1"/>
+                <p:nvPr/>
+              </p:nvSpPr>
+              <p:spPr>
+                <a:xfrm>
+                  <a:off x="6235902" y="2680919"/>
+                  <a:ext cx="1149674" cy="369332"/>
+                </a:xfrm>
+                <a:prstGeom prst="rect">
+                  <a:avLst/>
+                </a:prstGeom>
+                <a:noFill/>
+              </p:spPr>
+              <p:txBody>
+                <a:bodyPr wrap="none" rtlCol="0">
+                  <a:spAutoFit/>
+                </a:bodyPr>
+                <a:lstStyle/>
+                <a:p>
+                  <a:r>
+                    <a:rPr lang="en-US" dirty="0">
+                      <a:latin typeface="Courier New" panose="02070309020205020404" pitchFamily="49" charset="0"/>
+                      <a:cs typeface="Courier New" panose="02070309020205020404" pitchFamily="49" charset="0"/>
+                    </a:rPr>
+                    <a:t>h(k)(t)</a:t>
+                  </a:r>
+                </a:p>
+              </p:txBody>
+            </p:sp>
+          </p:grpSp>
+          <p:sp>
+            <p:nvSpPr>
+              <p:cNvPr id="148" name="TextBox 147"/>
+              <p:cNvSpPr txBox="1"/>
+              <p:nvPr/>
+            </p:nvSpPr>
+            <p:spPr>
+              <a:xfrm>
+                <a:off x="20161094" y="7677670"/>
+                <a:ext cx="2390398" cy="369332"/>
+              </a:xfrm>
+              <a:prstGeom prst="rect">
+                <a:avLst/>
+              </a:prstGeom>
+              <a:noFill/>
+            </p:spPr>
+            <p:txBody>
+              <a:bodyPr wrap="none" rtlCol="0">
+                <a:spAutoFit/>
+              </a:bodyPr>
+              <a:lstStyle/>
+              <a:p>
+                <a:pPr algn="ctr"/>
+                <a:r>
+                  <a:rPr lang="en-US" b="1" dirty="0">
+                    <a:latin typeface="Courier New" panose="02070309020205020404" pitchFamily="49" charset="0"/>
+                    <a:cs typeface="Courier New" panose="02070309020205020404" pitchFamily="49" charset="0"/>
+                  </a:rPr>
+                  <a:t>KELOMPOK FITUR K</a:t>
+                </a:r>
+              </a:p>
+            </p:txBody>
+          </p:sp>
+        </p:grpSp>
+      </p:grpSp>
+    </p:spTree>
+    <p:extLst>
+      <p:ext uri="{BB962C8B-B14F-4D97-AF65-F5344CB8AC3E}">
+        <p14:creationId xmlns:p14="http://schemas.microsoft.com/office/powerpoint/2010/main" val="3720903673"/>
       </p:ext>
     </p:extLst>
   </p:cSld>

</xml_diff>